<commit_message>
Almost completed project - remaing: Recovery & Clean Up
</commit_message>
<xml_diff>
--- a/Design Brief/ChelseaFC.pptx
+++ b/Design Brief/ChelseaFC.pptx
@@ -5,7 +5,7 @@
     <p:sldMasterId id="2147483648" r:id="rId1"/>
   </p:sldMasterIdLst>
   <p:notesMasterIdLst>
-    <p:notesMasterId r:id="rId10"/>
+    <p:notesMasterId r:id="rId15"/>
   </p:notesMasterIdLst>
   <p:sldIdLst>
     <p:sldId id="260" r:id="rId2"/>
@@ -15,7 +15,12 @@
     <p:sldId id="261" r:id="rId6"/>
     <p:sldId id="262" r:id="rId7"/>
     <p:sldId id="263" r:id="rId8"/>
-    <p:sldId id="264" r:id="rId9"/>
+    <p:sldId id="265" r:id="rId9"/>
+    <p:sldId id="266" r:id="rId10"/>
+    <p:sldId id="264" r:id="rId11"/>
+    <p:sldId id="267" r:id="rId12"/>
+    <p:sldId id="268" r:id="rId13"/>
+    <p:sldId id="269" r:id="rId14"/>
   </p:sldIdLst>
   <p:sldSz cx="12192000" cy="6858000"/>
   <p:notesSz cx="6858000" cy="9144000"/>
@@ -122,6 +127,147 @@
 </p:presentation>
 </file>
 
+<file path=ppt/revisionInfo.xml><?xml version="1.0" encoding="utf-8"?>
+<p1510:revInfo xmlns:a="http://schemas.openxmlformats.org/drawingml/2006/main" xmlns:r="http://schemas.openxmlformats.org/officeDocument/2006/relationships" xmlns:p1510="http://schemas.microsoft.com/office/powerpoint/2015/10/main">
+  <p1510:revLst>
+    <p1510:client id="{4B7EE704-5804-4286-9FEE-80D85A670E65}" v="7" dt="2025-03-28T11:23:42.024"/>
+  </p1510:revLst>
+</p1510:revInfo>
+</file>
+
+<file path=ppt/changesInfos/changesInfo1.xml><?xml version="1.0" encoding="utf-8"?>
+<pc:chgInfo xmlns:a="http://schemas.openxmlformats.org/drawingml/2006/main" xmlns:r="http://schemas.openxmlformats.org/officeDocument/2006/relationships" xmlns:ac="http://schemas.microsoft.com/office/drawing/2013/main/command" xmlns:pc="http://schemas.microsoft.com/office/powerpoint/2013/main/command">
+  <pc:docChgLst>
+    <pc:chgData name="Jeffrey Jose" userId="6e4416676935328d" providerId="LiveId" clId="{4B7EE704-5804-4286-9FEE-80D85A670E65}"/>
+    <pc:docChg chg="undo redo custSel addSld modSld">
+      <pc:chgData name="Jeffrey Jose" userId="6e4416676935328d" providerId="LiveId" clId="{4B7EE704-5804-4286-9FEE-80D85A670E65}" dt="2025-03-28T11:28:39.610" v="101" actId="208"/>
+      <pc:docMkLst>
+        <pc:docMk/>
+      </pc:docMkLst>
+      <pc:sldChg chg="addSp delSp modSp add mod">
+        <pc:chgData name="Jeffrey Jose" userId="6e4416676935328d" providerId="LiveId" clId="{4B7EE704-5804-4286-9FEE-80D85A670E65}" dt="2025-03-28T11:28:39.610" v="101" actId="208"/>
+        <pc:sldMkLst>
+          <pc:docMk/>
+          <pc:sldMk cId="367599833" sldId="265"/>
+        </pc:sldMkLst>
+        <pc:spChg chg="del">
+          <ac:chgData name="Jeffrey Jose" userId="6e4416676935328d" providerId="LiveId" clId="{4B7EE704-5804-4286-9FEE-80D85A670E65}" dt="2025-03-28T11:21:09.236" v="3" actId="478"/>
+          <ac:spMkLst>
+            <pc:docMk/>
+            <pc:sldMk cId="367599833" sldId="265"/>
+            <ac:spMk id="2" creationId="{42ECCD64-C43E-602D-F519-682790DC57D2}"/>
+          </ac:spMkLst>
+        </pc:spChg>
+        <pc:spChg chg="mod">
+          <ac:chgData name="Jeffrey Jose" userId="6e4416676935328d" providerId="LiveId" clId="{4B7EE704-5804-4286-9FEE-80D85A670E65}" dt="2025-03-28T11:28:31.394" v="100" actId="207"/>
+          <ac:spMkLst>
+            <pc:docMk/>
+            <pc:sldMk cId="367599833" sldId="265"/>
+            <ac:spMk id="3" creationId="{3E9F1FA1-38B7-C713-F5EC-3E74CEF5F55E}"/>
+          </ac:spMkLst>
+        </pc:spChg>
+        <pc:spChg chg="del mod">
+          <ac:chgData name="Jeffrey Jose" userId="6e4416676935328d" providerId="LiveId" clId="{4B7EE704-5804-4286-9FEE-80D85A670E65}" dt="2025-03-28T11:21:05.148" v="2" actId="478"/>
+          <ac:spMkLst>
+            <pc:docMk/>
+            <pc:sldMk cId="367599833" sldId="265"/>
+            <ac:spMk id="4" creationId="{C5A08147-2B7A-9870-802C-939AB1D9268E}"/>
+          </ac:spMkLst>
+        </pc:spChg>
+        <pc:spChg chg="del">
+          <ac:chgData name="Jeffrey Jose" userId="6e4416676935328d" providerId="LiveId" clId="{4B7EE704-5804-4286-9FEE-80D85A670E65}" dt="2025-03-28T11:21:15.346" v="7" actId="478"/>
+          <ac:spMkLst>
+            <pc:docMk/>
+            <pc:sldMk cId="367599833" sldId="265"/>
+            <ac:spMk id="6" creationId="{C2B4FC43-EC8E-2FBD-9CE0-51DEEA61B008}"/>
+          </ac:spMkLst>
+        </pc:spChg>
+        <pc:spChg chg="del">
+          <ac:chgData name="Jeffrey Jose" userId="6e4416676935328d" providerId="LiveId" clId="{4B7EE704-5804-4286-9FEE-80D85A670E65}" dt="2025-03-28T11:21:14.030" v="6" actId="478"/>
+          <ac:spMkLst>
+            <pc:docMk/>
+            <pc:sldMk cId="367599833" sldId="265"/>
+            <ac:spMk id="7" creationId="{900B5D0B-73FE-BDB1-BEAD-D41820F6CB3A}"/>
+          </ac:spMkLst>
+        </pc:spChg>
+        <pc:spChg chg="del">
+          <ac:chgData name="Jeffrey Jose" userId="6e4416676935328d" providerId="LiveId" clId="{4B7EE704-5804-4286-9FEE-80D85A670E65}" dt="2025-03-28T11:21:11.469" v="4" actId="478"/>
+          <ac:spMkLst>
+            <pc:docMk/>
+            <pc:sldMk cId="367599833" sldId="265"/>
+            <ac:spMk id="8" creationId="{927D8E1B-5D99-754B-6B88-EE6C3D081118}"/>
+          </ac:spMkLst>
+        </pc:spChg>
+        <pc:spChg chg="del">
+          <ac:chgData name="Jeffrey Jose" userId="6e4416676935328d" providerId="LiveId" clId="{4B7EE704-5804-4286-9FEE-80D85A670E65}" dt="2025-03-28T11:21:17.819" v="8" actId="478"/>
+          <ac:spMkLst>
+            <pc:docMk/>
+            <pc:sldMk cId="367599833" sldId="265"/>
+            <ac:spMk id="9" creationId="{8B487EAC-6E31-F9E9-C7FC-B8ABF7D04C26}"/>
+          </ac:spMkLst>
+        </pc:spChg>
+        <pc:spChg chg="add mod ord">
+          <ac:chgData name="Jeffrey Jose" userId="6e4416676935328d" providerId="LiveId" clId="{4B7EE704-5804-4286-9FEE-80D85A670E65}" dt="2025-03-28T11:23:16.517" v="25" actId="207"/>
+          <ac:spMkLst>
+            <pc:docMk/>
+            <pc:sldMk cId="367599833" sldId="265"/>
+            <ac:spMk id="11" creationId="{6B9D8AF9-C89A-29A9-D986-B2E82AD4623A}"/>
+          </ac:spMkLst>
+        </pc:spChg>
+        <pc:picChg chg="del">
+          <ac:chgData name="Jeffrey Jose" userId="6e4416676935328d" providerId="LiveId" clId="{4B7EE704-5804-4286-9FEE-80D85A670E65}" dt="2025-03-28T11:21:12.350" v="5" actId="478"/>
+          <ac:picMkLst>
+            <pc:docMk/>
+            <pc:sldMk cId="367599833" sldId="265"/>
+            <ac:picMk id="5" creationId="{0E12440D-CC6D-8B41-2D9D-7135ED75318A}"/>
+          </ac:picMkLst>
+        </pc:picChg>
+        <pc:picChg chg="del">
+          <ac:chgData name="Jeffrey Jose" userId="6e4416676935328d" providerId="LiveId" clId="{4B7EE704-5804-4286-9FEE-80D85A670E65}" dt="2025-03-28T11:21:19.931" v="11" actId="478"/>
+          <ac:picMkLst>
+            <pc:docMk/>
+            <pc:sldMk cId="367599833" sldId="265"/>
+            <ac:picMk id="10" creationId="{99C70F16-27EE-B0F5-1A83-BAC70D7D33B6}"/>
+          </ac:picMkLst>
+        </pc:picChg>
+        <pc:picChg chg="del">
+          <ac:chgData name="Jeffrey Jose" userId="6e4416676935328d" providerId="LiveId" clId="{4B7EE704-5804-4286-9FEE-80D85A670E65}" dt="2025-03-28T11:21:18.854" v="9" actId="478"/>
+          <ac:picMkLst>
+            <pc:docMk/>
+            <pc:sldMk cId="367599833" sldId="265"/>
+            <ac:picMk id="1028" creationId="{AD8CA341-1C37-157D-D7E7-B33434584613}"/>
+          </ac:picMkLst>
+        </pc:picChg>
+        <pc:picChg chg="del">
+          <ac:chgData name="Jeffrey Jose" userId="6e4416676935328d" providerId="LiveId" clId="{4B7EE704-5804-4286-9FEE-80D85A670E65}" dt="2025-03-28T11:21:19.439" v="10" actId="478"/>
+          <ac:picMkLst>
+            <pc:docMk/>
+            <pc:sldMk cId="367599833" sldId="265"/>
+            <ac:picMk id="1030" creationId="{91BF069B-F978-C651-C2E9-DF5578B5C997}"/>
+          </ac:picMkLst>
+        </pc:picChg>
+        <pc:cxnChg chg="add mod">
+          <ac:chgData name="Jeffrey Jose" userId="6e4416676935328d" providerId="LiveId" clId="{4B7EE704-5804-4286-9FEE-80D85A670E65}" dt="2025-03-28T11:28:39.610" v="101" actId="208"/>
+          <ac:cxnSpMkLst>
+            <pc:docMk/>
+            <pc:sldMk cId="367599833" sldId="265"/>
+            <ac:cxnSpMk id="13" creationId="{BA15B560-8900-8C98-77BC-52A9810725F7}"/>
+          </ac:cxnSpMkLst>
+        </pc:cxnChg>
+        <pc:cxnChg chg="add mod">
+          <ac:chgData name="Jeffrey Jose" userId="6e4416676935328d" providerId="LiveId" clId="{4B7EE704-5804-4286-9FEE-80D85A670E65}" dt="2025-03-28T11:28:39.610" v="101" actId="208"/>
+          <ac:cxnSpMkLst>
+            <pc:docMk/>
+            <pc:sldMk cId="367599833" sldId="265"/>
+            <ac:cxnSpMk id="14" creationId="{8D782264-5404-CFF1-94AD-906152B77048}"/>
+          </ac:cxnSpMkLst>
+        </pc:cxnChg>
+      </pc:sldChg>
+    </pc:docChg>
+  </pc:docChgLst>
+</pc:chgInfo>
+</file>
+
 <file path=ppt/notesMasters/notesMaster1.xml><?xml version="1.0" encoding="utf-8"?>
 <p:notesMaster xmlns:a="http://schemas.openxmlformats.org/drawingml/2006/main" xmlns:r="http://schemas.openxmlformats.org/officeDocument/2006/relationships" xmlns:p="http://schemas.openxmlformats.org/presentationml/2006/main">
   <p:cSld>
@@ -204,7 +350,7 @@
           <a:p>
             <a:fld id="{B30C6E76-467F-4E74-984F-8E38A108FA5F}" type="datetimeFigureOut">
               <a:rPr lang="en-AU" smtClean="0"/>
-              <a:t>22/03/2025</a:t>
+              <a:t>4/04/2025</a:t>
             </a:fld>
             <a:endParaRPr lang="en-AU"/>
           </a:p>
@@ -873,7 +1019,7 @@
           <a:p>
             <a:fld id="{92364D58-4FDE-4F36-AA0F-4CF509083915}" type="datetimeFigureOut">
               <a:rPr lang="en-AU" smtClean="0"/>
-              <a:t>22/03/2025</a:t>
+              <a:t>4/04/2025</a:t>
             </a:fld>
             <a:endParaRPr lang="en-AU"/>
           </a:p>
@@ -1073,7 +1219,7 @@
           <a:p>
             <a:fld id="{92364D58-4FDE-4F36-AA0F-4CF509083915}" type="datetimeFigureOut">
               <a:rPr lang="en-AU" smtClean="0"/>
-              <a:t>22/03/2025</a:t>
+              <a:t>4/04/2025</a:t>
             </a:fld>
             <a:endParaRPr lang="en-AU"/>
           </a:p>
@@ -1283,7 +1429,7 @@
           <a:p>
             <a:fld id="{92364D58-4FDE-4F36-AA0F-4CF509083915}" type="datetimeFigureOut">
               <a:rPr lang="en-AU" smtClean="0"/>
-              <a:t>22/03/2025</a:t>
+              <a:t>4/04/2025</a:t>
             </a:fld>
             <a:endParaRPr lang="en-AU"/>
           </a:p>
@@ -1483,7 +1629,7 @@
           <a:p>
             <a:fld id="{92364D58-4FDE-4F36-AA0F-4CF509083915}" type="datetimeFigureOut">
               <a:rPr lang="en-AU" smtClean="0"/>
-              <a:t>22/03/2025</a:t>
+              <a:t>4/04/2025</a:t>
             </a:fld>
             <a:endParaRPr lang="en-AU"/>
           </a:p>
@@ -1759,7 +1905,7 @@
           <a:p>
             <a:fld id="{92364D58-4FDE-4F36-AA0F-4CF509083915}" type="datetimeFigureOut">
               <a:rPr lang="en-AU" smtClean="0"/>
-              <a:t>22/03/2025</a:t>
+              <a:t>4/04/2025</a:t>
             </a:fld>
             <a:endParaRPr lang="en-AU"/>
           </a:p>
@@ -2027,7 +2173,7 @@
           <a:p>
             <a:fld id="{92364D58-4FDE-4F36-AA0F-4CF509083915}" type="datetimeFigureOut">
               <a:rPr lang="en-AU" smtClean="0"/>
-              <a:t>22/03/2025</a:t>
+              <a:t>4/04/2025</a:t>
             </a:fld>
             <a:endParaRPr lang="en-AU"/>
           </a:p>
@@ -2442,7 +2588,7 @@
           <a:p>
             <a:fld id="{92364D58-4FDE-4F36-AA0F-4CF509083915}" type="datetimeFigureOut">
               <a:rPr lang="en-AU" smtClean="0"/>
-              <a:t>22/03/2025</a:t>
+              <a:t>4/04/2025</a:t>
             </a:fld>
             <a:endParaRPr lang="en-AU"/>
           </a:p>
@@ -2584,7 +2730,7 @@
           <a:p>
             <a:fld id="{92364D58-4FDE-4F36-AA0F-4CF509083915}" type="datetimeFigureOut">
               <a:rPr lang="en-AU" smtClean="0"/>
-              <a:t>22/03/2025</a:t>
+              <a:t>4/04/2025</a:t>
             </a:fld>
             <a:endParaRPr lang="en-AU"/>
           </a:p>
@@ -2697,7 +2843,7 @@
           <a:p>
             <a:fld id="{92364D58-4FDE-4F36-AA0F-4CF509083915}" type="datetimeFigureOut">
               <a:rPr lang="en-AU" smtClean="0"/>
-              <a:t>22/03/2025</a:t>
+              <a:t>4/04/2025</a:t>
             </a:fld>
             <a:endParaRPr lang="en-AU"/>
           </a:p>
@@ -3010,7 +3156,7 @@
           <a:p>
             <a:fld id="{92364D58-4FDE-4F36-AA0F-4CF509083915}" type="datetimeFigureOut">
               <a:rPr lang="en-AU" smtClean="0"/>
-              <a:t>22/03/2025</a:t>
+              <a:t>4/04/2025</a:t>
             </a:fld>
             <a:endParaRPr lang="en-AU"/>
           </a:p>
@@ -3299,7 +3445,7 @@
           <a:p>
             <a:fld id="{92364D58-4FDE-4F36-AA0F-4CF509083915}" type="datetimeFigureOut">
               <a:rPr lang="en-AU" smtClean="0"/>
-              <a:t>22/03/2025</a:t>
+              <a:t>4/04/2025</a:t>
             </a:fld>
             <a:endParaRPr lang="en-AU"/>
           </a:p>
@@ -3542,7 +3688,7 @@
           <a:p>
             <a:fld id="{92364D58-4FDE-4F36-AA0F-4CF509083915}" type="datetimeFigureOut">
               <a:rPr lang="en-AU" smtClean="0"/>
-              <a:t>22/03/2025</a:t>
+              <a:t>4/04/2025</a:t>
             </a:fld>
             <a:endParaRPr lang="en-AU"/>
           </a:p>
@@ -4375,6 +4521,1811 @@
 </p:sld>
 </file>
 
+<file path=ppt/slides/slide10.xml><?xml version="1.0" encoding="utf-8"?>
+<p:sld xmlns:a="http://schemas.openxmlformats.org/drawingml/2006/main" xmlns:r="http://schemas.openxmlformats.org/officeDocument/2006/relationships" xmlns:p="http://schemas.openxmlformats.org/presentationml/2006/main">
+  <p:cSld>
+    <p:bg>
+      <p:bgPr>
+        <a:solidFill>
+          <a:schemeClr val="bg1"/>
+        </a:solidFill>
+        <a:effectLst/>
+      </p:bgPr>
+    </p:bg>
+    <p:spTree>
+      <p:nvGrpSpPr>
+        <p:cNvPr id="1" name=""/>
+        <p:cNvGrpSpPr/>
+        <p:nvPr/>
+      </p:nvGrpSpPr>
+      <p:grpSpPr>
+        <a:xfrm>
+          <a:off x="0" y="0"/>
+          <a:ext cx="0" cy="0"/>
+          <a:chOff x="0" y="0"/>
+          <a:chExt cx="0" cy="0"/>
+        </a:xfrm>
+      </p:grpSpPr>
+      <p:pic>
+        <p:nvPicPr>
+          <p:cNvPr id="1026" name="Picture 2" descr="A blue sky with clouds&#10;&#10;Description automatically generated">
+            <a:extLst>
+              <a:ext uri="{FF2B5EF4-FFF2-40B4-BE49-F238E27FC236}">
+                <a16:creationId xmlns:a16="http://schemas.microsoft.com/office/drawing/2014/main" id="{9546B39F-2D32-B59C-440A-D908F0CBE0A8}"/>
+              </a:ext>
+            </a:extLst>
+          </p:cNvPr>
+          <p:cNvPicPr>
+            <a:picLocks noGrp="1" noRot="1" noChangeAspect="1" noMove="1" noResize="1" noEditPoints="1" noAdjustHandles="1" noChangeArrowheads="1" noChangeShapeType="1" noCrop="1"/>
+          </p:cNvPicPr>
+          <p:nvPr/>
+        </p:nvPicPr>
+        <p:blipFill>
+          <a:blip r:embed="rId2">
+            <a:extLst>
+              <a:ext uri="{28A0092B-C50C-407E-A947-70E740481C1C}">
+                <a14:useLocalDpi xmlns:a14="http://schemas.microsoft.com/office/drawing/2010/main" val="0"/>
+              </a:ext>
+            </a:extLst>
+          </a:blip>
+          <a:srcRect b="19"/>
+          <a:stretch/>
+        </p:blipFill>
+        <p:spPr bwMode="auto">
+          <a:xfrm>
+            <a:off x="20" y="1282"/>
+            <a:ext cx="12191980" cy="6856718"/>
+          </a:xfrm>
+          <a:prstGeom prst="rect">
+            <a:avLst/>
+          </a:prstGeom>
+          <a:noFill/>
+          <a:extLst>
+            <a:ext uri="{909E8E84-426E-40DD-AFC4-6F175D3DCCD1}">
+              <a14:hiddenFill xmlns:a14="http://schemas.microsoft.com/office/drawing/2010/main">
+                <a:solidFill>
+                  <a:srgbClr val="FFFFFF"/>
+                </a:solidFill>
+              </a14:hiddenFill>
+            </a:ext>
+          </a:extLst>
+        </p:spPr>
+      </p:pic>
+      <p:sp>
+        <p:nvSpPr>
+          <p:cNvPr id="1031" name="Rectangle 1030">
+            <a:extLst>
+              <a:ext uri="{FF2B5EF4-FFF2-40B4-BE49-F238E27FC236}">
+                <a16:creationId xmlns:a16="http://schemas.microsoft.com/office/drawing/2014/main" id="{42A4FC2C-047E-45A5-965D-8E1E3BF09BC6}"/>
+              </a:ext>
+              <a:ext uri="{C183D7F6-B498-43B3-948B-1728B52AA6E4}">
+                <adec:decorative xmlns:adec="http://schemas.microsoft.com/office/drawing/2017/decorative" val="1"/>
+              </a:ext>
+            </a:extLst>
+          </p:cNvPr>
+          <p:cNvSpPr>
+            <a:spLocks noGrp="1" noRot="1" noChangeAspect="1" noMove="1" noResize="1" noEditPoints="1" noAdjustHandles="1" noChangeArrowheads="1" noChangeShapeType="1" noTextEdit="1"/>
+          </p:cNvSpPr>
+          <p:nvPr>
+            <p:extLst>
+              <p:ext uri="{386F3935-93C4-4BCD-93E2-E3B085C9AB24}">
+                <p16:designElem xmlns:p16="http://schemas.microsoft.com/office/powerpoint/2015/main" val="1"/>
+              </p:ext>
+            </p:extLst>
+          </p:nvPr>
+        </p:nvSpPr>
+        <p:spPr bwMode="white">
+          <a:xfrm>
+            <a:off x="1524" y="0"/>
+            <a:ext cx="12188952" cy="6858000"/>
+          </a:xfrm>
+          <a:prstGeom prst="rect">
+            <a:avLst/>
+          </a:prstGeom>
+          <a:noFill/>
+          <a:ln>
+            <a:noFill/>
+          </a:ln>
+        </p:spPr>
+        <p:style>
+          <a:lnRef idx="2">
+            <a:schemeClr val="accent1">
+              <a:shade val="50000"/>
+            </a:schemeClr>
+          </a:lnRef>
+          <a:fillRef idx="1">
+            <a:schemeClr val="accent1"/>
+          </a:fillRef>
+          <a:effectRef idx="0">
+            <a:schemeClr val="accent1"/>
+          </a:effectRef>
+          <a:fontRef idx="minor">
+            <a:schemeClr val="lt1"/>
+          </a:fontRef>
+        </p:style>
+        <p:txBody>
+          <a:bodyPr rtlCol="0" anchor="ctr"/>
+          <a:lstStyle>
+            <a:defPPr>
+              <a:defRPr lang="en-US"/>
+            </a:defPPr>
+            <a:lvl1pPr marL="0" algn="l" defTabSz="914400" rtl="0" eaLnBrk="1" latinLnBrk="0" hangingPunct="1">
+              <a:defRPr sz="1800" kern="1200">
+                <a:solidFill>
+                  <a:schemeClr val="lt1"/>
+                </a:solidFill>
+                <a:latin typeface="+mn-lt"/>
+                <a:ea typeface="+mn-ea"/>
+                <a:cs typeface="+mn-cs"/>
+              </a:defRPr>
+            </a:lvl1pPr>
+            <a:lvl2pPr marL="457200" algn="l" defTabSz="914400" rtl="0" eaLnBrk="1" latinLnBrk="0" hangingPunct="1">
+              <a:defRPr sz="1800" kern="1200">
+                <a:solidFill>
+                  <a:schemeClr val="lt1"/>
+                </a:solidFill>
+                <a:latin typeface="+mn-lt"/>
+                <a:ea typeface="+mn-ea"/>
+                <a:cs typeface="+mn-cs"/>
+              </a:defRPr>
+            </a:lvl2pPr>
+            <a:lvl3pPr marL="914400" algn="l" defTabSz="914400" rtl="0" eaLnBrk="1" latinLnBrk="0" hangingPunct="1">
+              <a:defRPr sz="1800" kern="1200">
+                <a:solidFill>
+                  <a:schemeClr val="lt1"/>
+                </a:solidFill>
+                <a:latin typeface="+mn-lt"/>
+                <a:ea typeface="+mn-ea"/>
+                <a:cs typeface="+mn-cs"/>
+              </a:defRPr>
+            </a:lvl3pPr>
+            <a:lvl4pPr marL="1371600" algn="l" defTabSz="914400" rtl="0" eaLnBrk="1" latinLnBrk="0" hangingPunct="1">
+              <a:defRPr sz="1800" kern="1200">
+                <a:solidFill>
+                  <a:schemeClr val="lt1"/>
+                </a:solidFill>
+                <a:latin typeface="+mn-lt"/>
+                <a:ea typeface="+mn-ea"/>
+                <a:cs typeface="+mn-cs"/>
+              </a:defRPr>
+            </a:lvl4pPr>
+            <a:lvl5pPr marL="1828800" algn="l" defTabSz="914400" rtl="0" eaLnBrk="1" latinLnBrk="0" hangingPunct="1">
+              <a:defRPr sz="1800" kern="1200">
+                <a:solidFill>
+                  <a:schemeClr val="lt1"/>
+                </a:solidFill>
+                <a:latin typeface="+mn-lt"/>
+                <a:ea typeface="+mn-ea"/>
+                <a:cs typeface="+mn-cs"/>
+              </a:defRPr>
+            </a:lvl5pPr>
+            <a:lvl6pPr marL="2286000" algn="l" defTabSz="914400" rtl="0" eaLnBrk="1" latinLnBrk="0" hangingPunct="1">
+              <a:defRPr sz="1800" kern="1200">
+                <a:solidFill>
+                  <a:schemeClr val="lt1"/>
+                </a:solidFill>
+                <a:latin typeface="+mn-lt"/>
+                <a:ea typeface="+mn-ea"/>
+                <a:cs typeface="+mn-cs"/>
+              </a:defRPr>
+            </a:lvl6pPr>
+            <a:lvl7pPr marL="2743200" algn="l" defTabSz="914400" rtl="0" eaLnBrk="1" latinLnBrk="0" hangingPunct="1">
+              <a:defRPr sz="1800" kern="1200">
+                <a:solidFill>
+                  <a:schemeClr val="lt1"/>
+                </a:solidFill>
+                <a:latin typeface="+mn-lt"/>
+                <a:ea typeface="+mn-ea"/>
+                <a:cs typeface="+mn-cs"/>
+              </a:defRPr>
+            </a:lvl7pPr>
+            <a:lvl8pPr marL="3200400" algn="l" defTabSz="914400" rtl="0" eaLnBrk="1" latinLnBrk="0" hangingPunct="1">
+              <a:defRPr sz="1800" kern="1200">
+                <a:solidFill>
+                  <a:schemeClr val="lt1"/>
+                </a:solidFill>
+                <a:latin typeface="+mn-lt"/>
+                <a:ea typeface="+mn-ea"/>
+                <a:cs typeface="+mn-cs"/>
+              </a:defRPr>
+            </a:lvl8pPr>
+            <a:lvl9pPr marL="3657600" algn="l" defTabSz="914400" rtl="0" eaLnBrk="1" latinLnBrk="0" hangingPunct="1">
+              <a:defRPr sz="1800" kern="1200">
+                <a:solidFill>
+                  <a:schemeClr val="lt1"/>
+                </a:solidFill>
+                <a:latin typeface="+mn-lt"/>
+                <a:ea typeface="+mn-ea"/>
+                <a:cs typeface="+mn-cs"/>
+              </a:defRPr>
+            </a:lvl9pPr>
+          </a:lstStyle>
+          <a:p>
+            <a:pPr algn="ctr"/>
+            <a:endParaRPr lang="en-US"/>
+          </a:p>
+        </p:txBody>
+      </p:sp>
+      <p:sp>
+        <p:nvSpPr>
+          <p:cNvPr id="3" name="Rectangle 2">
+            <a:extLst>
+              <a:ext uri="{FF2B5EF4-FFF2-40B4-BE49-F238E27FC236}">
+                <a16:creationId xmlns:a16="http://schemas.microsoft.com/office/drawing/2014/main" id="{B3FF3331-9823-4E15-8BCA-01BD880D90FC}"/>
+              </a:ext>
+            </a:extLst>
+          </p:cNvPr>
+          <p:cNvSpPr/>
+          <p:nvPr/>
+        </p:nvSpPr>
+        <p:spPr>
+          <a:xfrm>
+            <a:off x="328108" y="0"/>
+            <a:ext cx="3668358" cy="6858000"/>
+          </a:xfrm>
+          <a:prstGeom prst="rect">
+            <a:avLst/>
+          </a:prstGeom>
+          <a:gradFill flip="none" rotWithShape="1">
+            <a:gsLst>
+              <a:gs pos="0">
+                <a:srgbClr val="034694">
+                  <a:shade val="30000"/>
+                  <a:satMod val="115000"/>
+                </a:srgbClr>
+              </a:gs>
+              <a:gs pos="50000">
+                <a:srgbClr val="034694">
+                  <a:shade val="67500"/>
+                  <a:satMod val="115000"/>
+                </a:srgbClr>
+              </a:gs>
+              <a:gs pos="100000">
+                <a:srgbClr val="034694">
+                  <a:shade val="100000"/>
+                  <a:satMod val="115000"/>
+                </a:srgbClr>
+              </a:gs>
+            </a:gsLst>
+            <a:lin ang="5400000" scaled="1"/>
+            <a:tileRect/>
+          </a:gradFill>
+          <a:ln>
+            <a:noFill/>
+          </a:ln>
+        </p:spPr>
+        <p:style>
+          <a:lnRef idx="2">
+            <a:schemeClr val="accent1">
+              <a:shade val="15000"/>
+            </a:schemeClr>
+          </a:lnRef>
+          <a:fillRef idx="1">
+            <a:schemeClr val="accent1"/>
+          </a:fillRef>
+          <a:effectRef idx="0">
+            <a:schemeClr val="accent1"/>
+          </a:effectRef>
+          <a:fontRef idx="minor">
+            <a:schemeClr val="lt1"/>
+          </a:fontRef>
+        </p:style>
+        <p:txBody>
+          <a:bodyPr rtlCol="0" anchor="ctr"/>
+          <a:lstStyle/>
+          <a:p>
+            <a:pPr algn="ctr"/>
+            <a:endParaRPr lang="en-AU">
+              <a:solidFill>
+                <a:srgbClr val="034694"/>
+              </a:solidFill>
+            </a:endParaRPr>
+          </a:p>
+        </p:txBody>
+      </p:sp>
+      <p:sp>
+        <p:nvSpPr>
+          <p:cNvPr id="4" name="Rectangle 3">
+            <a:extLst>
+              <a:ext uri="{FF2B5EF4-FFF2-40B4-BE49-F238E27FC236}">
+                <a16:creationId xmlns:a16="http://schemas.microsoft.com/office/drawing/2014/main" id="{1BBA20C6-F9D0-750A-90A8-E39ACA9688B2}"/>
+              </a:ext>
+            </a:extLst>
+          </p:cNvPr>
+          <p:cNvSpPr/>
+          <p:nvPr/>
+        </p:nvSpPr>
+        <p:spPr>
+          <a:xfrm>
+            <a:off x="-86061" y="3429000"/>
+            <a:ext cx="3915783" cy="3099495"/>
+          </a:xfrm>
+          <a:prstGeom prst="rect">
+            <a:avLst/>
+          </a:prstGeom>
+          <a:solidFill>
+            <a:schemeClr val="bg1"/>
+          </a:solidFill>
+          <a:ln>
+            <a:noFill/>
+          </a:ln>
+        </p:spPr>
+        <p:style>
+          <a:lnRef idx="2">
+            <a:schemeClr val="accent1">
+              <a:shade val="15000"/>
+            </a:schemeClr>
+          </a:lnRef>
+          <a:fillRef idx="1">
+            <a:schemeClr val="accent1"/>
+          </a:fillRef>
+          <a:effectRef idx="0">
+            <a:schemeClr val="accent1"/>
+          </a:effectRef>
+          <a:fontRef idx="minor">
+            <a:schemeClr val="lt1"/>
+          </a:fontRef>
+        </p:style>
+        <p:txBody>
+          <a:bodyPr rtlCol="0" anchor="ctr"/>
+          <a:lstStyle/>
+          <a:p>
+            <a:pPr algn="ctr"/>
+            <a:endParaRPr lang="en-AU"/>
+          </a:p>
+        </p:txBody>
+      </p:sp>
+      <p:pic>
+        <p:nvPicPr>
+          <p:cNvPr id="1030" name="Picture 6" descr="Premier League Logo White - Premier League Logo White Png Transparent ...">
+            <a:extLst>
+              <a:ext uri="{FF2B5EF4-FFF2-40B4-BE49-F238E27FC236}">
+                <a16:creationId xmlns:a16="http://schemas.microsoft.com/office/drawing/2014/main" id="{1F8EECCF-5509-5024-B238-017FC0D2D219}"/>
+              </a:ext>
+            </a:extLst>
+          </p:cNvPr>
+          <p:cNvPicPr>
+            <a:picLocks noChangeAspect="1" noChangeArrowheads="1"/>
+          </p:cNvPicPr>
+          <p:nvPr/>
+        </p:nvPicPr>
+        <p:blipFill>
+          <a:blip r:embed="rId3">
+            <a:extLst>
+              <a:ext uri="{28A0092B-C50C-407E-A947-70E740481C1C}">
+                <a14:useLocalDpi xmlns:a14="http://schemas.microsoft.com/office/drawing/2010/main" val="0"/>
+              </a:ext>
+            </a:extLst>
+          </a:blip>
+          <a:srcRect/>
+          <a:stretch>
+            <a:fillRect/>
+          </a:stretch>
+        </p:blipFill>
+        <p:spPr bwMode="auto">
+          <a:xfrm>
+            <a:off x="853863" y="2881355"/>
+            <a:ext cx="560406" cy="467413"/>
+          </a:xfrm>
+          <a:prstGeom prst="rect">
+            <a:avLst/>
+          </a:prstGeom>
+          <a:noFill/>
+          <a:extLst>
+            <a:ext uri="{909E8E84-426E-40DD-AFC4-6F175D3DCCD1}">
+              <a14:hiddenFill xmlns:a14="http://schemas.microsoft.com/office/drawing/2010/main">
+                <a:solidFill>
+                  <a:srgbClr val="FFFFFF"/>
+                </a:solidFill>
+              </a14:hiddenFill>
+            </a:ext>
+          </a:extLst>
+        </p:spPr>
+      </p:pic>
+      <p:pic>
+        <p:nvPicPr>
+          <p:cNvPr id="10" name="Picture 4">
+            <a:extLst>
+              <a:ext uri="{FF2B5EF4-FFF2-40B4-BE49-F238E27FC236}">
+                <a16:creationId xmlns:a16="http://schemas.microsoft.com/office/drawing/2014/main" id="{9A616D45-18A2-A515-610C-2D8001D1A68E}"/>
+              </a:ext>
+            </a:extLst>
+          </p:cNvPr>
+          <p:cNvPicPr>
+            <a:picLocks noChangeAspect="1" noChangeArrowheads="1"/>
+          </p:cNvPicPr>
+          <p:nvPr/>
+        </p:nvPicPr>
+        <p:blipFill>
+          <a:blip r:embed="rId4">
+            <a:extLst>
+              <a:ext uri="{28A0092B-C50C-407E-A947-70E740481C1C}">
+                <a14:useLocalDpi xmlns:a14="http://schemas.microsoft.com/office/drawing/2010/main" val="0"/>
+              </a:ext>
+            </a:extLst>
+          </a:blip>
+          <a:srcRect/>
+          <a:stretch>
+            <a:fillRect/>
+          </a:stretch>
+        </p:blipFill>
+        <p:spPr bwMode="auto">
+          <a:xfrm>
+            <a:off x="1378603" y="2881355"/>
+            <a:ext cx="498666" cy="509789"/>
+          </a:xfrm>
+          <a:prstGeom prst="rect">
+            <a:avLst/>
+          </a:prstGeom>
+          <a:noFill/>
+          <a:extLst>
+            <a:ext uri="{909E8E84-426E-40DD-AFC4-6F175D3DCCD1}">
+              <a14:hiddenFill xmlns:a14="http://schemas.microsoft.com/office/drawing/2010/main">
+                <a:solidFill>
+                  <a:srgbClr val="FFFFFF"/>
+                </a:solidFill>
+              </a14:hiddenFill>
+            </a:ext>
+          </a:extLst>
+        </p:spPr>
+      </p:pic>
+    </p:spTree>
+    <p:extLst>
+      <p:ext uri="{BB962C8B-B14F-4D97-AF65-F5344CB8AC3E}">
+        <p14:creationId xmlns:p14="http://schemas.microsoft.com/office/powerpoint/2010/main" val="3364396473"/>
+      </p:ext>
+    </p:extLst>
+  </p:cSld>
+  <p:clrMapOvr>
+    <a:masterClrMapping/>
+  </p:clrMapOvr>
+</p:sld>
+</file>
+
+<file path=ppt/slides/slide11.xml><?xml version="1.0" encoding="utf-8"?>
+<p:sld xmlns:a="http://schemas.openxmlformats.org/drawingml/2006/main" xmlns:r="http://schemas.openxmlformats.org/officeDocument/2006/relationships" xmlns:p="http://schemas.openxmlformats.org/presentationml/2006/main">
+  <p:cSld>
+    <p:bg>
+      <p:bgPr>
+        <a:solidFill>
+          <a:schemeClr val="bg1"/>
+        </a:solidFill>
+        <a:effectLst/>
+      </p:bgPr>
+    </p:bg>
+    <p:spTree>
+      <p:nvGrpSpPr>
+        <p:cNvPr id="1" name="">
+          <a:extLst>
+            <a:ext uri="{FF2B5EF4-FFF2-40B4-BE49-F238E27FC236}">
+              <a16:creationId xmlns:a16="http://schemas.microsoft.com/office/drawing/2014/main" id="{AD18428B-DF6D-DA4C-2820-50D2FC57FA53}"/>
+            </a:ext>
+          </a:extLst>
+        </p:cNvPr>
+        <p:cNvGrpSpPr/>
+        <p:nvPr/>
+      </p:nvGrpSpPr>
+      <p:grpSpPr>
+        <a:xfrm>
+          <a:off x="0" y="0"/>
+          <a:ext cx="0" cy="0"/>
+          <a:chOff x="0" y="0"/>
+          <a:chExt cx="0" cy="0"/>
+        </a:xfrm>
+      </p:grpSpPr>
+      <p:pic>
+        <p:nvPicPr>
+          <p:cNvPr id="1026" name="Picture 2" descr="A blue sky with clouds&#10;&#10;Description automatically generated">
+            <a:extLst>
+              <a:ext uri="{FF2B5EF4-FFF2-40B4-BE49-F238E27FC236}">
+                <a16:creationId xmlns:a16="http://schemas.microsoft.com/office/drawing/2014/main" id="{A7EBD527-A4BC-9E0B-05C5-892ABBD84E19}"/>
+              </a:ext>
+            </a:extLst>
+          </p:cNvPr>
+          <p:cNvPicPr>
+            <a:picLocks noGrp="1" noRot="1" noChangeAspect="1" noMove="1" noResize="1" noEditPoints="1" noAdjustHandles="1" noChangeArrowheads="1" noChangeShapeType="1" noCrop="1"/>
+          </p:cNvPicPr>
+          <p:nvPr/>
+        </p:nvPicPr>
+        <p:blipFill>
+          <a:blip r:embed="rId2">
+            <a:extLst>
+              <a:ext uri="{28A0092B-C50C-407E-A947-70E740481C1C}">
+                <a14:useLocalDpi xmlns:a14="http://schemas.microsoft.com/office/drawing/2010/main" val="0"/>
+              </a:ext>
+            </a:extLst>
+          </a:blip>
+          <a:srcRect b="19"/>
+          <a:stretch/>
+        </p:blipFill>
+        <p:spPr bwMode="auto">
+          <a:xfrm>
+            <a:off x="20" y="1282"/>
+            <a:ext cx="12191980" cy="6856718"/>
+          </a:xfrm>
+          <a:prstGeom prst="rect">
+            <a:avLst/>
+          </a:prstGeom>
+          <a:noFill/>
+          <a:extLst>
+            <a:ext uri="{909E8E84-426E-40DD-AFC4-6F175D3DCCD1}">
+              <a14:hiddenFill xmlns:a14="http://schemas.microsoft.com/office/drawing/2010/main">
+                <a:solidFill>
+                  <a:srgbClr val="FFFFFF"/>
+                </a:solidFill>
+              </a14:hiddenFill>
+            </a:ext>
+          </a:extLst>
+        </p:spPr>
+      </p:pic>
+      <p:sp>
+        <p:nvSpPr>
+          <p:cNvPr id="1031" name="Rectangle 1030">
+            <a:extLst>
+              <a:ext uri="{FF2B5EF4-FFF2-40B4-BE49-F238E27FC236}">
+                <a16:creationId xmlns:a16="http://schemas.microsoft.com/office/drawing/2014/main" id="{7C431C3B-7793-B637-DA08-DF95B4FCF4E0}"/>
+              </a:ext>
+              <a:ext uri="{C183D7F6-B498-43B3-948B-1728B52AA6E4}">
+                <adec:decorative xmlns:adec="http://schemas.microsoft.com/office/drawing/2017/decorative" val="1"/>
+              </a:ext>
+            </a:extLst>
+          </p:cNvPr>
+          <p:cNvSpPr>
+            <a:spLocks noGrp="1" noRot="1" noChangeAspect="1" noMove="1" noResize="1" noEditPoints="1" noAdjustHandles="1" noChangeArrowheads="1" noChangeShapeType="1" noTextEdit="1"/>
+          </p:cNvSpPr>
+          <p:nvPr>
+            <p:extLst>
+              <p:ext uri="{386F3935-93C4-4BCD-93E2-E3B085C9AB24}">
+                <p16:designElem xmlns:p16="http://schemas.microsoft.com/office/powerpoint/2015/main" val="1"/>
+              </p:ext>
+            </p:extLst>
+          </p:nvPr>
+        </p:nvSpPr>
+        <p:spPr bwMode="white">
+          <a:xfrm>
+            <a:off x="1524" y="0"/>
+            <a:ext cx="12188952" cy="6858000"/>
+          </a:xfrm>
+          <a:prstGeom prst="rect">
+            <a:avLst/>
+          </a:prstGeom>
+          <a:noFill/>
+          <a:ln>
+            <a:noFill/>
+          </a:ln>
+        </p:spPr>
+        <p:style>
+          <a:lnRef idx="2">
+            <a:schemeClr val="accent1">
+              <a:shade val="50000"/>
+            </a:schemeClr>
+          </a:lnRef>
+          <a:fillRef idx="1">
+            <a:schemeClr val="accent1"/>
+          </a:fillRef>
+          <a:effectRef idx="0">
+            <a:schemeClr val="accent1"/>
+          </a:effectRef>
+          <a:fontRef idx="minor">
+            <a:schemeClr val="lt1"/>
+          </a:fontRef>
+        </p:style>
+        <p:txBody>
+          <a:bodyPr rtlCol="0" anchor="ctr"/>
+          <a:lstStyle>
+            <a:defPPr>
+              <a:defRPr lang="en-US"/>
+            </a:defPPr>
+            <a:lvl1pPr marL="0" algn="l" defTabSz="914400" rtl="0" eaLnBrk="1" latinLnBrk="0" hangingPunct="1">
+              <a:defRPr sz="1800" kern="1200">
+                <a:solidFill>
+                  <a:schemeClr val="lt1"/>
+                </a:solidFill>
+                <a:latin typeface="+mn-lt"/>
+                <a:ea typeface="+mn-ea"/>
+                <a:cs typeface="+mn-cs"/>
+              </a:defRPr>
+            </a:lvl1pPr>
+            <a:lvl2pPr marL="457200" algn="l" defTabSz="914400" rtl="0" eaLnBrk="1" latinLnBrk="0" hangingPunct="1">
+              <a:defRPr sz="1800" kern="1200">
+                <a:solidFill>
+                  <a:schemeClr val="lt1"/>
+                </a:solidFill>
+                <a:latin typeface="+mn-lt"/>
+                <a:ea typeface="+mn-ea"/>
+                <a:cs typeface="+mn-cs"/>
+              </a:defRPr>
+            </a:lvl2pPr>
+            <a:lvl3pPr marL="914400" algn="l" defTabSz="914400" rtl="0" eaLnBrk="1" latinLnBrk="0" hangingPunct="1">
+              <a:defRPr sz="1800" kern="1200">
+                <a:solidFill>
+                  <a:schemeClr val="lt1"/>
+                </a:solidFill>
+                <a:latin typeface="+mn-lt"/>
+                <a:ea typeface="+mn-ea"/>
+                <a:cs typeface="+mn-cs"/>
+              </a:defRPr>
+            </a:lvl3pPr>
+            <a:lvl4pPr marL="1371600" algn="l" defTabSz="914400" rtl="0" eaLnBrk="1" latinLnBrk="0" hangingPunct="1">
+              <a:defRPr sz="1800" kern="1200">
+                <a:solidFill>
+                  <a:schemeClr val="lt1"/>
+                </a:solidFill>
+                <a:latin typeface="+mn-lt"/>
+                <a:ea typeface="+mn-ea"/>
+                <a:cs typeface="+mn-cs"/>
+              </a:defRPr>
+            </a:lvl4pPr>
+            <a:lvl5pPr marL="1828800" algn="l" defTabSz="914400" rtl="0" eaLnBrk="1" latinLnBrk="0" hangingPunct="1">
+              <a:defRPr sz="1800" kern="1200">
+                <a:solidFill>
+                  <a:schemeClr val="lt1"/>
+                </a:solidFill>
+                <a:latin typeface="+mn-lt"/>
+                <a:ea typeface="+mn-ea"/>
+                <a:cs typeface="+mn-cs"/>
+              </a:defRPr>
+            </a:lvl5pPr>
+            <a:lvl6pPr marL="2286000" algn="l" defTabSz="914400" rtl="0" eaLnBrk="1" latinLnBrk="0" hangingPunct="1">
+              <a:defRPr sz="1800" kern="1200">
+                <a:solidFill>
+                  <a:schemeClr val="lt1"/>
+                </a:solidFill>
+                <a:latin typeface="+mn-lt"/>
+                <a:ea typeface="+mn-ea"/>
+                <a:cs typeface="+mn-cs"/>
+              </a:defRPr>
+            </a:lvl6pPr>
+            <a:lvl7pPr marL="2743200" algn="l" defTabSz="914400" rtl="0" eaLnBrk="1" latinLnBrk="0" hangingPunct="1">
+              <a:defRPr sz="1800" kern="1200">
+                <a:solidFill>
+                  <a:schemeClr val="lt1"/>
+                </a:solidFill>
+                <a:latin typeface="+mn-lt"/>
+                <a:ea typeface="+mn-ea"/>
+                <a:cs typeface="+mn-cs"/>
+              </a:defRPr>
+            </a:lvl7pPr>
+            <a:lvl8pPr marL="3200400" algn="l" defTabSz="914400" rtl="0" eaLnBrk="1" latinLnBrk="0" hangingPunct="1">
+              <a:defRPr sz="1800" kern="1200">
+                <a:solidFill>
+                  <a:schemeClr val="lt1"/>
+                </a:solidFill>
+                <a:latin typeface="+mn-lt"/>
+                <a:ea typeface="+mn-ea"/>
+                <a:cs typeface="+mn-cs"/>
+              </a:defRPr>
+            </a:lvl8pPr>
+            <a:lvl9pPr marL="3657600" algn="l" defTabSz="914400" rtl="0" eaLnBrk="1" latinLnBrk="0" hangingPunct="1">
+              <a:defRPr sz="1800" kern="1200">
+                <a:solidFill>
+                  <a:schemeClr val="lt1"/>
+                </a:solidFill>
+                <a:latin typeface="+mn-lt"/>
+                <a:ea typeface="+mn-ea"/>
+                <a:cs typeface="+mn-cs"/>
+              </a:defRPr>
+            </a:lvl9pPr>
+          </a:lstStyle>
+          <a:p>
+            <a:pPr algn="ctr"/>
+            <a:endParaRPr lang="en-US"/>
+          </a:p>
+        </p:txBody>
+      </p:sp>
+      <p:sp>
+        <p:nvSpPr>
+          <p:cNvPr id="2" name="TextBox 1">
+            <a:extLst>
+              <a:ext uri="{FF2B5EF4-FFF2-40B4-BE49-F238E27FC236}">
+                <a16:creationId xmlns:a16="http://schemas.microsoft.com/office/drawing/2014/main" id="{0BF50252-D398-356F-BE81-21C266AA381C}"/>
+              </a:ext>
+            </a:extLst>
+          </p:cNvPr>
+          <p:cNvSpPr txBox="1"/>
+          <p:nvPr/>
+        </p:nvSpPr>
+        <p:spPr>
+          <a:xfrm>
+            <a:off x="3704767" y="134471"/>
+            <a:ext cx="4782463" cy="584775"/>
+          </a:xfrm>
+          <a:prstGeom prst="rect">
+            <a:avLst/>
+          </a:prstGeom>
+          <a:noFill/>
+        </p:spPr>
+        <p:txBody>
+          <a:bodyPr wrap="none" rtlCol="0">
+            <a:spAutoFit/>
+          </a:bodyPr>
+          <a:lstStyle/>
+          <a:p>
+            <a:r>
+              <a:rPr lang="en-AU" sz="3200" b="1" dirty="0">
+                <a:solidFill>
+                  <a:schemeClr val="bg1"/>
+                </a:solidFill>
+                <a:latin typeface="Times New Roman" panose="02020603050405020304" pitchFamily="18" charset="0"/>
+                <a:ea typeface="STZhongsong" panose="020B0503020204020204" pitchFamily="2" charset="-122"/>
+                <a:cs typeface="Times New Roman" panose="02020603050405020304" pitchFamily="18" charset="0"/>
+              </a:rPr>
+              <a:t>Priority Areas Monitoring</a:t>
+            </a:r>
+          </a:p>
+        </p:txBody>
+      </p:sp>
+      <p:sp>
+        <p:nvSpPr>
+          <p:cNvPr id="8" name="Rectangle: Rounded Corners 7">
+            <a:extLst>
+              <a:ext uri="{FF2B5EF4-FFF2-40B4-BE49-F238E27FC236}">
+                <a16:creationId xmlns:a16="http://schemas.microsoft.com/office/drawing/2014/main" id="{59AD1B7E-6F44-154E-E8B7-109631412F1C}"/>
+              </a:ext>
+            </a:extLst>
+          </p:cNvPr>
+          <p:cNvSpPr/>
+          <p:nvPr/>
+        </p:nvSpPr>
+        <p:spPr>
+          <a:xfrm>
+            <a:off x="168536" y="1941755"/>
+            <a:ext cx="11836651" cy="4781774"/>
+          </a:xfrm>
+          <a:prstGeom prst="roundRect">
+            <a:avLst>
+              <a:gd name="adj" fmla="val 7257"/>
+            </a:avLst>
+          </a:prstGeom>
+          <a:noFill/>
+          <a:ln>
+            <a:solidFill>
+              <a:srgbClr val="DBA111"/>
+            </a:solidFill>
+          </a:ln>
+        </p:spPr>
+        <p:style>
+          <a:lnRef idx="2">
+            <a:schemeClr val="accent1">
+              <a:shade val="15000"/>
+            </a:schemeClr>
+          </a:lnRef>
+          <a:fillRef idx="1">
+            <a:schemeClr val="accent1"/>
+          </a:fillRef>
+          <a:effectRef idx="0">
+            <a:schemeClr val="accent1"/>
+          </a:effectRef>
+          <a:fontRef idx="minor">
+            <a:schemeClr val="lt1"/>
+          </a:fontRef>
+        </p:style>
+        <p:txBody>
+          <a:bodyPr rtlCol="0" anchor="ctr"/>
+          <a:lstStyle/>
+          <a:p>
+            <a:pPr algn="ctr"/>
+            <a:endParaRPr lang="en-AU"/>
+          </a:p>
+        </p:txBody>
+      </p:sp>
+    </p:spTree>
+    <p:extLst>
+      <p:ext uri="{BB962C8B-B14F-4D97-AF65-F5344CB8AC3E}">
+        <p14:creationId xmlns:p14="http://schemas.microsoft.com/office/powerpoint/2010/main" val="690687269"/>
+      </p:ext>
+    </p:extLst>
+  </p:cSld>
+  <p:clrMapOvr>
+    <a:masterClrMapping/>
+  </p:clrMapOvr>
+</p:sld>
+</file>
+
+<file path=ppt/slides/slide12.xml><?xml version="1.0" encoding="utf-8"?>
+<p:sld xmlns:a="http://schemas.openxmlformats.org/drawingml/2006/main" xmlns:r="http://schemas.openxmlformats.org/officeDocument/2006/relationships" xmlns:p="http://schemas.openxmlformats.org/presentationml/2006/main">
+  <p:cSld>
+    <p:bg>
+      <p:bgPr>
+        <a:solidFill>
+          <a:schemeClr val="bg1"/>
+        </a:solidFill>
+        <a:effectLst/>
+      </p:bgPr>
+    </p:bg>
+    <p:spTree>
+      <p:nvGrpSpPr>
+        <p:cNvPr id="1" name="">
+          <a:extLst>
+            <a:ext uri="{FF2B5EF4-FFF2-40B4-BE49-F238E27FC236}">
+              <a16:creationId xmlns:a16="http://schemas.microsoft.com/office/drawing/2014/main" id="{20DA119E-AAC9-2FAE-FD63-358E21AFA342}"/>
+            </a:ext>
+          </a:extLst>
+        </p:cNvPr>
+        <p:cNvGrpSpPr/>
+        <p:nvPr/>
+      </p:nvGrpSpPr>
+      <p:grpSpPr>
+        <a:xfrm>
+          <a:off x="0" y="0"/>
+          <a:ext cx="0" cy="0"/>
+          <a:chOff x="0" y="0"/>
+          <a:chExt cx="0" cy="0"/>
+        </a:xfrm>
+      </p:grpSpPr>
+      <p:pic>
+        <p:nvPicPr>
+          <p:cNvPr id="1026" name="Picture 2" descr="A blue sky with clouds&#10;&#10;Description automatically generated">
+            <a:extLst>
+              <a:ext uri="{FF2B5EF4-FFF2-40B4-BE49-F238E27FC236}">
+                <a16:creationId xmlns:a16="http://schemas.microsoft.com/office/drawing/2014/main" id="{DFDEBA36-6E86-FE67-3432-E2A082E6705F}"/>
+              </a:ext>
+            </a:extLst>
+          </p:cNvPr>
+          <p:cNvPicPr>
+            <a:picLocks noGrp="1" noRot="1" noChangeAspect="1" noMove="1" noResize="1" noEditPoints="1" noAdjustHandles="1" noChangeArrowheads="1" noChangeShapeType="1" noCrop="1"/>
+          </p:cNvPicPr>
+          <p:nvPr/>
+        </p:nvPicPr>
+        <p:blipFill>
+          <a:blip r:embed="rId2">
+            <a:extLst>
+              <a:ext uri="{28A0092B-C50C-407E-A947-70E740481C1C}">
+                <a14:useLocalDpi xmlns:a14="http://schemas.microsoft.com/office/drawing/2010/main" val="0"/>
+              </a:ext>
+            </a:extLst>
+          </a:blip>
+          <a:srcRect b="19"/>
+          <a:stretch/>
+        </p:blipFill>
+        <p:spPr bwMode="auto">
+          <a:xfrm>
+            <a:off x="20" y="1282"/>
+            <a:ext cx="12191980" cy="6856718"/>
+          </a:xfrm>
+          <a:prstGeom prst="rect">
+            <a:avLst/>
+          </a:prstGeom>
+          <a:noFill/>
+          <a:extLst>
+            <a:ext uri="{909E8E84-426E-40DD-AFC4-6F175D3DCCD1}">
+              <a14:hiddenFill xmlns:a14="http://schemas.microsoft.com/office/drawing/2010/main">
+                <a:solidFill>
+                  <a:srgbClr val="FFFFFF"/>
+                </a:solidFill>
+              </a14:hiddenFill>
+            </a:ext>
+          </a:extLst>
+        </p:spPr>
+      </p:pic>
+      <p:sp>
+        <p:nvSpPr>
+          <p:cNvPr id="1031" name="Rectangle 1030">
+            <a:extLst>
+              <a:ext uri="{FF2B5EF4-FFF2-40B4-BE49-F238E27FC236}">
+                <a16:creationId xmlns:a16="http://schemas.microsoft.com/office/drawing/2014/main" id="{8D562931-0EF3-48AA-7393-E1D35604BE7A}"/>
+              </a:ext>
+              <a:ext uri="{C183D7F6-B498-43B3-948B-1728B52AA6E4}">
+                <adec:decorative xmlns:adec="http://schemas.microsoft.com/office/drawing/2017/decorative" val="1"/>
+              </a:ext>
+            </a:extLst>
+          </p:cNvPr>
+          <p:cNvSpPr>
+            <a:spLocks noGrp="1" noRot="1" noChangeAspect="1" noMove="1" noResize="1" noEditPoints="1" noAdjustHandles="1" noChangeArrowheads="1" noChangeShapeType="1" noTextEdit="1"/>
+          </p:cNvSpPr>
+          <p:nvPr>
+            <p:extLst>
+              <p:ext uri="{386F3935-93C4-4BCD-93E2-E3B085C9AB24}">
+                <p16:designElem xmlns:p16="http://schemas.microsoft.com/office/powerpoint/2015/main" val="1"/>
+              </p:ext>
+            </p:extLst>
+          </p:nvPr>
+        </p:nvSpPr>
+        <p:spPr bwMode="white">
+          <a:xfrm>
+            <a:off x="1524" y="0"/>
+            <a:ext cx="12188952" cy="6858000"/>
+          </a:xfrm>
+          <a:prstGeom prst="rect">
+            <a:avLst/>
+          </a:prstGeom>
+          <a:noFill/>
+          <a:ln>
+            <a:noFill/>
+          </a:ln>
+        </p:spPr>
+        <p:style>
+          <a:lnRef idx="2">
+            <a:schemeClr val="accent1">
+              <a:shade val="50000"/>
+            </a:schemeClr>
+          </a:lnRef>
+          <a:fillRef idx="1">
+            <a:schemeClr val="accent1"/>
+          </a:fillRef>
+          <a:effectRef idx="0">
+            <a:schemeClr val="accent1"/>
+          </a:effectRef>
+          <a:fontRef idx="minor">
+            <a:schemeClr val="lt1"/>
+          </a:fontRef>
+        </p:style>
+        <p:txBody>
+          <a:bodyPr rtlCol="0" anchor="ctr"/>
+          <a:lstStyle>
+            <a:defPPr>
+              <a:defRPr lang="en-US"/>
+            </a:defPPr>
+            <a:lvl1pPr marL="0" algn="l" defTabSz="914400" rtl="0" eaLnBrk="1" latinLnBrk="0" hangingPunct="1">
+              <a:defRPr sz="1800" kern="1200">
+                <a:solidFill>
+                  <a:schemeClr val="lt1"/>
+                </a:solidFill>
+                <a:latin typeface="+mn-lt"/>
+                <a:ea typeface="+mn-ea"/>
+                <a:cs typeface="+mn-cs"/>
+              </a:defRPr>
+            </a:lvl1pPr>
+            <a:lvl2pPr marL="457200" algn="l" defTabSz="914400" rtl="0" eaLnBrk="1" latinLnBrk="0" hangingPunct="1">
+              <a:defRPr sz="1800" kern="1200">
+                <a:solidFill>
+                  <a:schemeClr val="lt1"/>
+                </a:solidFill>
+                <a:latin typeface="+mn-lt"/>
+                <a:ea typeface="+mn-ea"/>
+                <a:cs typeface="+mn-cs"/>
+              </a:defRPr>
+            </a:lvl2pPr>
+            <a:lvl3pPr marL="914400" algn="l" defTabSz="914400" rtl="0" eaLnBrk="1" latinLnBrk="0" hangingPunct="1">
+              <a:defRPr sz="1800" kern="1200">
+                <a:solidFill>
+                  <a:schemeClr val="lt1"/>
+                </a:solidFill>
+                <a:latin typeface="+mn-lt"/>
+                <a:ea typeface="+mn-ea"/>
+                <a:cs typeface="+mn-cs"/>
+              </a:defRPr>
+            </a:lvl3pPr>
+            <a:lvl4pPr marL="1371600" algn="l" defTabSz="914400" rtl="0" eaLnBrk="1" latinLnBrk="0" hangingPunct="1">
+              <a:defRPr sz="1800" kern="1200">
+                <a:solidFill>
+                  <a:schemeClr val="lt1"/>
+                </a:solidFill>
+                <a:latin typeface="+mn-lt"/>
+                <a:ea typeface="+mn-ea"/>
+                <a:cs typeface="+mn-cs"/>
+              </a:defRPr>
+            </a:lvl4pPr>
+            <a:lvl5pPr marL="1828800" algn="l" defTabSz="914400" rtl="0" eaLnBrk="1" latinLnBrk="0" hangingPunct="1">
+              <a:defRPr sz="1800" kern="1200">
+                <a:solidFill>
+                  <a:schemeClr val="lt1"/>
+                </a:solidFill>
+                <a:latin typeface="+mn-lt"/>
+                <a:ea typeface="+mn-ea"/>
+                <a:cs typeface="+mn-cs"/>
+              </a:defRPr>
+            </a:lvl5pPr>
+            <a:lvl6pPr marL="2286000" algn="l" defTabSz="914400" rtl="0" eaLnBrk="1" latinLnBrk="0" hangingPunct="1">
+              <a:defRPr sz="1800" kern="1200">
+                <a:solidFill>
+                  <a:schemeClr val="lt1"/>
+                </a:solidFill>
+                <a:latin typeface="+mn-lt"/>
+                <a:ea typeface="+mn-ea"/>
+                <a:cs typeface="+mn-cs"/>
+              </a:defRPr>
+            </a:lvl6pPr>
+            <a:lvl7pPr marL="2743200" algn="l" defTabSz="914400" rtl="0" eaLnBrk="1" latinLnBrk="0" hangingPunct="1">
+              <a:defRPr sz="1800" kern="1200">
+                <a:solidFill>
+                  <a:schemeClr val="lt1"/>
+                </a:solidFill>
+                <a:latin typeface="+mn-lt"/>
+                <a:ea typeface="+mn-ea"/>
+                <a:cs typeface="+mn-cs"/>
+              </a:defRPr>
+            </a:lvl7pPr>
+            <a:lvl8pPr marL="3200400" algn="l" defTabSz="914400" rtl="0" eaLnBrk="1" latinLnBrk="0" hangingPunct="1">
+              <a:defRPr sz="1800" kern="1200">
+                <a:solidFill>
+                  <a:schemeClr val="lt1"/>
+                </a:solidFill>
+                <a:latin typeface="+mn-lt"/>
+                <a:ea typeface="+mn-ea"/>
+                <a:cs typeface="+mn-cs"/>
+              </a:defRPr>
+            </a:lvl8pPr>
+            <a:lvl9pPr marL="3657600" algn="l" defTabSz="914400" rtl="0" eaLnBrk="1" latinLnBrk="0" hangingPunct="1">
+              <a:defRPr sz="1800" kern="1200">
+                <a:solidFill>
+                  <a:schemeClr val="lt1"/>
+                </a:solidFill>
+                <a:latin typeface="+mn-lt"/>
+                <a:ea typeface="+mn-ea"/>
+                <a:cs typeface="+mn-cs"/>
+              </a:defRPr>
+            </a:lvl9pPr>
+          </a:lstStyle>
+          <a:p>
+            <a:pPr algn="ctr"/>
+            <a:endParaRPr lang="en-US"/>
+          </a:p>
+        </p:txBody>
+      </p:sp>
+      <p:sp>
+        <p:nvSpPr>
+          <p:cNvPr id="2" name="TextBox 1">
+            <a:extLst>
+              <a:ext uri="{FF2B5EF4-FFF2-40B4-BE49-F238E27FC236}">
+                <a16:creationId xmlns:a16="http://schemas.microsoft.com/office/drawing/2014/main" id="{23272F1E-A5F1-DAB4-8359-1E595C19516E}"/>
+              </a:ext>
+            </a:extLst>
+          </p:cNvPr>
+          <p:cNvSpPr txBox="1"/>
+          <p:nvPr/>
+        </p:nvSpPr>
+        <p:spPr>
+          <a:xfrm>
+            <a:off x="4174640" y="134471"/>
+            <a:ext cx="3842719" cy="584775"/>
+          </a:xfrm>
+          <a:prstGeom prst="rect">
+            <a:avLst/>
+          </a:prstGeom>
+          <a:noFill/>
+        </p:spPr>
+        <p:txBody>
+          <a:bodyPr wrap="none" rtlCol="0">
+            <a:spAutoFit/>
+          </a:bodyPr>
+          <a:lstStyle/>
+          <a:p>
+            <a:r>
+              <a:rPr lang="en-AU" sz="3200" b="1" dirty="0">
+                <a:solidFill>
+                  <a:schemeClr val="bg1"/>
+                </a:solidFill>
+                <a:latin typeface="Times New Roman" panose="02020603050405020304" pitchFamily="18" charset="0"/>
+                <a:ea typeface="STZhongsong" panose="020B0503020204020204" pitchFamily="2" charset="-122"/>
+                <a:cs typeface="Times New Roman" panose="02020603050405020304" pitchFamily="18" charset="0"/>
+              </a:rPr>
+              <a:t>Physical Capabilities</a:t>
+            </a:r>
+          </a:p>
+        </p:txBody>
+      </p:sp>
+      <p:sp>
+        <p:nvSpPr>
+          <p:cNvPr id="3" name="Rectangle: Rounded Corners 2">
+            <a:extLst>
+              <a:ext uri="{FF2B5EF4-FFF2-40B4-BE49-F238E27FC236}">
+                <a16:creationId xmlns:a16="http://schemas.microsoft.com/office/drawing/2014/main" id="{AADF9297-1D02-032F-8A10-1F59EAFC691F}"/>
+              </a:ext>
+            </a:extLst>
+          </p:cNvPr>
+          <p:cNvSpPr/>
+          <p:nvPr/>
+        </p:nvSpPr>
+        <p:spPr>
+          <a:xfrm>
+            <a:off x="177674" y="2875877"/>
+            <a:ext cx="3479926" cy="3801148"/>
+          </a:xfrm>
+          <a:prstGeom prst="roundRect">
+            <a:avLst>
+              <a:gd name="adj" fmla="val 7257"/>
+            </a:avLst>
+          </a:prstGeom>
+          <a:noFill/>
+          <a:ln>
+            <a:solidFill>
+              <a:srgbClr val="DBA111"/>
+            </a:solidFill>
+          </a:ln>
+        </p:spPr>
+        <p:style>
+          <a:lnRef idx="2">
+            <a:schemeClr val="accent1">
+              <a:shade val="15000"/>
+            </a:schemeClr>
+          </a:lnRef>
+          <a:fillRef idx="1">
+            <a:schemeClr val="accent1"/>
+          </a:fillRef>
+          <a:effectRef idx="0">
+            <a:schemeClr val="accent1"/>
+          </a:effectRef>
+          <a:fontRef idx="minor">
+            <a:schemeClr val="lt1"/>
+          </a:fontRef>
+        </p:style>
+        <p:txBody>
+          <a:bodyPr rtlCol="0" anchor="ctr"/>
+          <a:lstStyle/>
+          <a:p>
+            <a:pPr algn="ctr"/>
+            <a:endParaRPr lang="en-AU"/>
+          </a:p>
+        </p:txBody>
+      </p:sp>
+      <p:sp>
+        <p:nvSpPr>
+          <p:cNvPr id="4" name="Rectangle: Rounded Corners 3">
+            <a:extLst>
+              <a:ext uri="{FF2B5EF4-FFF2-40B4-BE49-F238E27FC236}">
+                <a16:creationId xmlns:a16="http://schemas.microsoft.com/office/drawing/2014/main" id="{77D421EC-6470-6257-8897-B11CE550D23D}"/>
+              </a:ext>
+            </a:extLst>
+          </p:cNvPr>
+          <p:cNvSpPr/>
+          <p:nvPr/>
+        </p:nvSpPr>
+        <p:spPr>
+          <a:xfrm>
+            <a:off x="4174640" y="2875876"/>
+            <a:ext cx="3479926" cy="3801147"/>
+          </a:xfrm>
+          <a:prstGeom prst="roundRect">
+            <a:avLst>
+              <a:gd name="adj" fmla="val 7257"/>
+            </a:avLst>
+          </a:prstGeom>
+          <a:noFill/>
+          <a:ln>
+            <a:solidFill>
+              <a:srgbClr val="DBA111"/>
+            </a:solidFill>
+          </a:ln>
+        </p:spPr>
+        <p:style>
+          <a:lnRef idx="2">
+            <a:schemeClr val="accent1">
+              <a:shade val="15000"/>
+            </a:schemeClr>
+          </a:lnRef>
+          <a:fillRef idx="1">
+            <a:schemeClr val="accent1"/>
+          </a:fillRef>
+          <a:effectRef idx="0">
+            <a:schemeClr val="accent1"/>
+          </a:effectRef>
+          <a:fontRef idx="minor">
+            <a:schemeClr val="lt1"/>
+          </a:fontRef>
+        </p:style>
+        <p:txBody>
+          <a:bodyPr rtlCol="0" anchor="ctr"/>
+          <a:lstStyle/>
+          <a:p>
+            <a:pPr algn="ctr"/>
+            <a:endParaRPr lang="en-AU"/>
+          </a:p>
+        </p:txBody>
+      </p:sp>
+      <p:sp>
+        <p:nvSpPr>
+          <p:cNvPr id="5" name="Rectangle: Rounded Corners 4">
+            <a:extLst>
+              <a:ext uri="{FF2B5EF4-FFF2-40B4-BE49-F238E27FC236}">
+                <a16:creationId xmlns:a16="http://schemas.microsoft.com/office/drawing/2014/main" id="{CE0DCBB2-4FBC-B561-1A18-AB4737C28725}"/>
+              </a:ext>
+            </a:extLst>
+          </p:cNvPr>
+          <p:cNvSpPr/>
+          <p:nvPr/>
+        </p:nvSpPr>
+        <p:spPr>
+          <a:xfrm>
+            <a:off x="8292974" y="2875877"/>
+            <a:ext cx="3479926" cy="3801146"/>
+          </a:xfrm>
+          <a:prstGeom prst="roundRect">
+            <a:avLst>
+              <a:gd name="adj" fmla="val 7257"/>
+            </a:avLst>
+          </a:prstGeom>
+          <a:noFill/>
+          <a:ln>
+            <a:solidFill>
+              <a:srgbClr val="DBA111"/>
+            </a:solidFill>
+          </a:ln>
+        </p:spPr>
+        <p:style>
+          <a:lnRef idx="2">
+            <a:schemeClr val="accent1">
+              <a:shade val="15000"/>
+            </a:schemeClr>
+          </a:lnRef>
+          <a:fillRef idx="1">
+            <a:schemeClr val="accent1"/>
+          </a:fillRef>
+          <a:effectRef idx="0">
+            <a:schemeClr val="accent1"/>
+          </a:effectRef>
+          <a:fontRef idx="minor">
+            <a:schemeClr val="lt1"/>
+          </a:fontRef>
+        </p:style>
+        <p:txBody>
+          <a:bodyPr rtlCol="0" anchor="ctr"/>
+          <a:lstStyle/>
+          <a:p>
+            <a:pPr algn="ctr"/>
+            <a:endParaRPr lang="en-AU"/>
+          </a:p>
+        </p:txBody>
+      </p:sp>
+      <p:sp>
+        <p:nvSpPr>
+          <p:cNvPr id="9" name="Rectangle: Rounded Corners 8">
+            <a:extLst>
+              <a:ext uri="{FF2B5EF4-FFF2-40B4-BE49-F238E27FC236}">
+                <a16:creationId xmlns:a16="http://schemas.microsoft.com/office/drawing/2014/main" id="{1C603E78-6B41-D4D5-4E56-4C25C64B4E3D}"/>
+              </a:ext>
+            </a:extLst>
+          </p:cNvPr>
+          <p:cNvSpPr/>
+          <p:nvPr/>
+        </p:nvSpPr>
+        <p:spPr>
+          <a:xfrm>
+            <a:off x="4622450" y="1651635"/>
+            <a:ext cx="1292153" cy="1106245"/>
+          </a:xfrm>
+          <a:prstGeom prst="roundRect">
+            <a:avLst>
+              <a:gd name="adj" fmla="val 7257"/>
+            </a:avLst>
+          </a:prstGeom>
+          <a:noFill/>
+          <a:ln>
+            <a:solidFill>
+              <a:srgbClr val="DBA111"/>
+            </a:solidFill>
+          </a:ln>
+        </p:spPr>
+        <p:style>
+          <a:lnRef idx="2">
+            <a:schemeClr val="accent1">
+              <a:shade val="15000"/>
+            </a:schemeClr>
+          </a:lnRef>
+          <a:fillRef idx="1">
+            <a:schemeClr val="accent1"/>
+          </a:fillRef>
+          <a:effectRef idx="0">
+            <a:schemeClr val="accent1"/>
+          </a:effectRef>
+          <a:fontRef idx="minor">
+            <a:schemeClr val="lt1"/>
+          </a:fontRef>
+        </p:style>
+        <p:txBody>
+          <a:bodyPr rtlCol="0" anchor="ctr"/>
+          <a:lstStyle/>
+          <a:p>
+            <a:pPr algn="ctr"/>
+            <a:endParaRPr lang="en-AU"/>
+          </a:p>
+        </p:txBody>
+      </p:sp>
+      <p:sp>
+        <p:nvSpPr>
+          <p:cNvPr id="12" name="Rectangle: Rounded Corners 11">
+            <a:extLst>
+              <a:ext uri="{FF2B5EF4-FFF2-40B4-BE49-F238E27FC236}">
+                <a16:creationId xmlns:a16="http://schemas.microsoft.com/office/drawing/2014/main" id="{36EBBB77-B2F5-8133-2F86-7EDE71CB61A5}"/>
+              </a:ext>
+            </a:extLst>
+          </p:cNvPr>
+          <p:cNvSpPr/>
+          <p:nvPr/>
+        </p:nvSpPr>
+        <p:spPr>
+          <a:xfrm>
+            <a:off x="6095998" y="1647041"/>
+            <a:ext cx="1292153" cy="1106245"/>
+          </a:xfrm>
+          <a:prstGeom prst="roundRect">
+            <a:avLst>
+              <a:gd name="adj" fmla="val 7257"/>
+            </a:avLst>
+          </a:prstGeom>
+          <a:noFill/>
+          <a:ln>
+            <a:solidFill>
+              <a:srgbClr val="DBA111"/>
+            </a:solidFill>
+          </a:ln>
+        </p:spPr>
+        <p:style>
+          <a:lnRef idx="2">
+            <a:schemeClr val="accent1">
+              <a:shade val="15000"/>
+            </a:schemeClr>
+          </a:lnRef>
+          <a:fillRef idx="1">
+            <a:schemeClr val="accent1"/>
+          </a:fillRef>
+          <a:effectRef idx="0">
+            <a:schemeClr val="accent1"/>
+          </a:effectRef>
+          <a:fontRef idx="minor">
+            <a:schemeClr val="lt1"/>
+          </a:fontRef>
+        </p:style>
+        <p:txBody>
+          <a:bodyPr rtlCol="0" anchor="ctr"/>
+          <a:lstStyle/>
+          <a:p>
+            <a:pPr algn="ctr"/>
+            <a:endParaRPr lang="en-AU"/>
+          </a:p>
+        </p:txBody>
+      </p:sp>
+      <p:sp>
+        <p:nvSpPr>
+          <p:cNvPr id="13" name="Rectangle: Rounded Corners 12">
+            <a:extLst>
+              <a:ext uri="{FF2B5EF4-FFF2-40B4-BE49-F238E27FC236}">
+                <a16:creationId xmlns:a16="http://schemas.microsoft.com/office/drawing/2014/main" id="{E1C75C45-FDC4-344C-E56C-F9AAC0C494CE}"/>
+              </a:ext>
+            </a:extLst>
+          </p:cNvPr>
+          <p:cNvSpPr/>
+          <p:nvPr/>
+        </p:nvSpPr>
+        <p:spPr>
+          <a:xfrm>
+            <a:off x="7568020" y="1647041"/>
+            <a:ext cx="1292153" cy="1106245"/>
+          </a:xfrm>
+          <a:prstGeom prst="roundRect">
+            <a:avLst>
+              <a:gd name="adj" fmla="val 7257"/>
+            </a:avLst>
+          </a:prstGeom>
+          <a:noFill/>
+          <a:ln>
+            <a:solidFill>
+              <a:srgbClr val="DBA111"/>
+            </a:solidFill>
+          </a:ln>
+        </p:spPr>
+        <p:style>
+          <a:lnRef idx="2">
+            <a:schemeClr val="accent1">
+              <a:shade val="15000"/>
+            </a:schemeClr>
+          </a:lnRef>
+          <a:fillRef idx="1">
+            <a:schemeClr val="accent1"/>
+          </a:fillRef>
+          <a:effectRef idx="0">
+            <a:schemeClr val="accent1"/>
+          </a:effectRef>
+          <a:fontRef idx="minor">
+            <a:schemeClr val="lt1"/>
+          </a:fontRef>
+        </p:style>
+        <p:txBody>
+          <a:bodyPr rtlCol="0" anchor="ctr"/>
+          <a:lstStyle/>
+          <a:p>
+            <a:pPr algn="ctr"/>
+            <a:endParaRPr lang="en-AU"/>
+          </a:p>
+        </p:txBody>
+      </p:sp>
+      <p:sp>
+        <p:nvSpPr>
+          <p:cNvPr id="14" name="Rectangle: Rounded Corners 13">
+            <a:extLst>
+              <a:ext uri="{FF2B5EF4-FFF2-40B4-BE49-F238E27FC236}">
+                <a16:creationId xmlns:a16="http://schemas.microsoft.com/office/drawing/2014/main" id="{1418B0B4-177B-7BCE-BEA7-9DAC39B72152}"/>
+              </a:ext>
+            </a:extLst>
+          </p:cNvPr>
+          <p:cNvSpPr/>
+          <p:nvPr/>
+        </p:nvSpPr>
+        <p:spPr>
+          <a:xfrm>
+            <a:off x="3131374" y="1647040"/>
+            <a:ext cx="1292153" cy="1106245"/>
+          </a:xfrm>
+          <a:prstGeom prst="roundRect">
+            <a:avLst>
+              <a:gd name="adj" fmla="val 7257"/>
+            </a:avLst>
+          </a:prstGeom>
+          <a:noFill/>
+          <a:ln>
+            <a:solidFill>
+              <a:srgbClr val="DBA111"/>
+            </a:solidFill>
+          </a:ln>
+        </p:spPr>
+        <p:style>
+          <a:lnRef idx="2">
+            <a:schemeClr val="accent1">
+              <a:shade val="15000"/>
+            </a:schemeClr>
+          </a:lnRef>
+          <a:fillRef idx="1">
+            <a:schemeClr val="accent1"/>
+          </a:fillRef>
+          <a:effectRef idx="0">
+            <a:schemeClr val="accent1"/>
+          </a:effectRef>
+          <a:fontRef idx="minor">
+            <a:schemeClr val="lt1"/>
+          </a:fontRef>
+        </p:style>
+        <p:txBody>
+          <a:bodyPr rtlCol="0" anchor="ctr"/>
+          <a:lstStyle/>
+          <a:p>
+            <a:pPr algn="ctr"/>
+            <a:endParaRPr lang="en-AU"/>
+          </a:p>
+        </p:txBody>
+      </p:sp>
+    </p:spTree>
+    <p:extLst>
+      <p:ext uri="{BB962C8B-B14F-4D97-AF65-F5344CB8AC3E}">
+        <p14:creationId xmlns:p14="http://schemas.microsoft.com/office/powerpoint/2010/main" val="2007258212"/>
+      </p:ext>
+    </p:extLst>
+  </p:cSld>
+  <p:clrMapOvr>
+    <a:masterClrMapping/>
+  </p:clrMapOvr>
+</p:sld>
+</file>
+
+<file path=ppt/slides/slide13.xml><?xml version="1.0" encoding="utf-8"?>
+<p:sld xmlns:a="http://schemas.openxmlformats.org/drawingml/2006/main" xmlns:r="http://schemas.openxmlformats.org/officeDocument/2006/relationships" xmlns:p="http://schemas.openxmlformats.org/presentationml/2006/main">
+  <p:cSld>
+    <p:bg>
+      <p:bgPr>
+        <a:solidFill>
+          <a:schemeClr val="bg1"/>
+        </a:solidFill>
+        <a:effectLst/>
+      </p:bgPr>
+    </p:bg>
+    <p:spTree>
+      <p:nvGrpSpPr>
+        <p:cNvPr id="1" name="">
+          <a:extLst>
+            <a:ext uri="{FF2B5EF4-FFF2-40B4-BE49-F238E27FC236}">
+              <a16:creationId xmlns:a16="http://schemas.microsoft.com/office/drawing/2014/main" id="{5740758F-F468-8034-667A-8AEFA91A7DAD}"/>
+            </a:ext>
+          </a:extLst>
+        </p:cNvPr>
+        <p:cNvGrpSpPr/>
+        <p:nvPr/>
+      </p:nvGrpSpPr>
+      <p:grpSpPr>
+        <a:xfrm>
+          <a:off x="0" y="0"/>
+          <a:ext cx="0" cy="0"/>
+          <a:chOff x="0" y="0"/>
+          <a:chExt cx="0" cy="0"/>
+        </a:xfrm>
+      </p:grpSpPr>
+      <p:pic>
+        <p:nvPicPr>
+          <p:cNvPr id="1026" name="Picture 2" descr="A blue sky with clouds&#10;&#10;Description automatically generated">
+            <a:extLst>
+              <a:ext uri="{FF2B5EF4-FFF2-40B4-BE49-F238E27FC236}">
+                <a16:creationId xmlns:a16="http://schemas.microsoft.com/office/drawing/2014/main" id="{52813376-314D-7F3C-29AC-53A300678A6E}"/>
+              </a:ext>
+            </a:extLst>
+          </p:cNvPr>
+          <p:cNvPicPr>
+            <a:picLocks noGrp="1" noRot="1" noChangeAspect="1" noMove="1" noResize="1" noEditPoints="1" noAdjustHandles="1" noChangeArrowheads="1" noChangeShapeType="1" noCrop="1"/>
+          </p:cNvPicPr>
+          <p:nvPr/>
+        </p:nvPicPr>
+        <p:blipFill>
+          <a:blip r:embed="rId2">
+            <a:extLst>
+              <a:ext uri="{28A0092B-C50C-407E-A947-70E740481C1C}">
+                <a14:useLocalDpi xmlns:a14="http://schemas.microsoft.com/office/drawing/2010/main" val="0"/>
+              </a:ext>
+            </a:extLst>
+          </a:blip>
+          <a:srcRect b="19"/>
+          <a:stretch/>
+        </p:blipFill>
+        <p:spPr bwMode="auto">
+          <a:xfrm>
+            <a:off x="20" y="1282"/>
+            <a:ext cx="12191980" cy="6856718"/>
+          </a:xfrm>
+          <a:prstGeom prst="rect">
+            <a:avLst/>
+          </a:prstGeom>
+          <a:noFill/>
+          <a:extLst>
+            <a:ext uri="{909E8E84-426E-40DD-AFC4-6F175D3DCCD1}">
+              <a14:hiddenFill xmlns:a14="http://schemas.microsoft.com/office/drawing/2010/main">
+                <a:solidFill>
+                  <a:srgbClr val="FFFFFF"/>
+                </a:solidFill>
+              </a14:hiddenFill>
+            </a:ext>
+          </a:extLst>
+        </p:spPr>
+      </p:pic>
+      <p:sp>
+        <p:nvSpPr>
+          <p:cNvPr id="1031" name="Rectangle 1030">
+            <a:extLst>
+              <a:ext uri="{FF2B5EF4-FFF2-40B4-BE49-F238E27FC236}">
+                <a16:creationId xmlns:a16="http://schemas.microsoft.com/office/drawing/2014/main" id="{D9109D39-41A0-B1C8-A608-D06584AA5845}"/>
+              </a:ext>
+              <a:ext uri="{C183D7F6-B498-43B3-948B-1728B52AA6E4}">
+                <adec:decorative xmlns:adec="http://schemas.microsoft.com/office/drawing/2017/decorative" val="1"/>
+              </a:ext>
+            </a:extLst>
+          </p:cNvPr>
+          <p:cNvSpPr>
+            <a:spLocks noGrp="1" noRot="1" noChangeAspect="1" noMove="1" noResize="1" noEditPoints="1" noAdjustHandles="1" noChangeArrowheads="1" noChangeShapeType="1" noTextEdit="1"/>
+          </p:cNvSpPr>
+          <p:nvPr>
+            <p:extLst>
+              <p:ext uri="{386F3935-93C4-4BCD-93E2-E3B085C9AB24}">
+                <p16:designElem xmlns:p16="http://schemas.microsoft.com/office/powerpoint/2015/main" val="1"/>
+              </p:ext>
+            </p:extLst>
+          </p:nvPr>
+        </p:nvSpPr>
+        <p:spPr bwMode="white">
+          <a:xfrm>
+            <a:off x="1524" y="0"/>
+            <a:ext cx="12188952" cy="6858000"/>
+          </a:xfrm>
+          <a:prstGeom prst="rect">
+            <a:avLst/>
+          </a:prstGeom>
+          <a:noFill/>
+          <a:ln>
+            <a:noFill/>
+          </a:ln>
+        </p:spPr>
+        <p:style>
+          <a:lnRef idx="2">
+            <a:schemeClr val="accent1">
+              <a:shade val="50000"/>
+            </a:schemeClr>
+          </a:lnRef>
+          <a:fillRef idx="1">
+            <a:schemeClr val="accent1"/>
+          </a:fillRef>
+          <a:effectRef idx="0">
+            <a:schemeClr val="accent1"/>
+          </a:effectRef>
+          <a:fontRef idx="minor">
+            <a:schemeClr val="lt1"/>
+          </a:fontRef>
+        </p:style>
+        <p:txBody>
+          <a:bodyPr rtlCol="0" anchor="ctr"/>
+          <a:lstStyle>
+            <a:defPPr>
+              <a:defRPr lang="en-US"/>
+            </a:defPPr>
+            <a:lvl1pPr marL="0" algn="l" defTabSz="914400" rtl="0" eaLnBrk="1" latinLnBrk="0" hangingPunct="1">
+              <a:defRPr sz="1800" kern="1200">
+                <a:solidFill>
+                  <a:schemeClr val="lt1"/>
+                </a:solidFill>
+                <a:latin typeface="+mn-lt"/>
+                <a:ea typeface="+mn-ea"/>
+                <a:cs typeface="+mn-cs"/>
+              </a:defRPr>
+            </a:lvl1pPr>
+            <a:lvl2pPr marL="457200" algn="l" defTabSz="914400" rtl="0" eaLnBrk="1" latinLnBrk="0" hangingPunct="1">
+              <a:defRPr sz="1800" kern="1200">
+                <a:solidFill>
+                  <a:schemeClr val="lt1"/>
+                </a:solidFill>
+                <a:latin typeface="+mn-lt"/>
+                <a:ea typeface="+mn-ea"/>
+                <a:cs typeface="+mn-cs"/>
+              </a:defRPr>
+            </a:lvl2pPr>
+            <a:lvl3pPr marL="914400" algn="l" defTabSz="914400" rtl="0" eaLnBrk="1" latinLnBrk="0" hangingPunct="1">
+              <a:defRPr sz="1800" kern="1200">
+                <a:solidFill>
+                  <a:schemeClr val="lt1"/>
+                </a:solidFill>
+                <a:latin typeface="+mn-lt"/>
+                <a:ea typeface="+mn-ea"/>
+                <a:cs typeface="+mn-cs"/>
+              </a:defRPr>
+            </a:lvl3pPr>
+            <a:lvl4pPr marL="1371600" algn="l" defTabSz="914400" rtl="0" eaLnBrk="1" latinLnBrk="0" hangingPunct="1">
+              <a:defRPr sz="1800" kern="1200">
+                <a:solidFill>
+                  <a:schemeClr val="lt1"/>
+                </a:solidFill>
+                <a:latin typeface="+mn-lt"/>
+                <a:ea typeface="+mn-ea"/>
+                <a:cs typeface="+mn-cs"/>
+              </a:defRPr>
+            </a:lvl4pPr>
+            <a:lvl5pPr marL="1828800" algn="l" defTabSz="914400" rtl="0" eaLnBrk="1" latinLnBrk="0" hangingPunct="1">
+              <a:defRPr sz="1800" kern="1200">
+                <a:solidFill>
+                  <a:schemeClr val="lt1"/>
+                </a:solidFill>
+                <a:latin typeface="+mn-lt"/>
+                <a:ea typeface="+mn-ea"/>
+                <a:cs typeface="+mn-cs"/>
+              </a:defRPr>
+            </a:lvl5pPr>
+            <a:lvl6pPr marL="2286000" algn="l" defTabSz="914400" rtl="0" eaLnBrk="1" latinLnBrk="0" hangingPunct="1">
+              <a:defRPr sz="1800" kern="1200">
+                <a:solidFill>
+                  <a:schemeClr val="lt1"/>
+                </a:solidFill>
+                <a:latin typeface="+mn-lt"/>
+                <a:ea typeface="+mn-ea"/>
+                <a:cs typeface="+mn-cs"/>
+              </a:defRPr>
+            </a:lvl6pPr>
+            <a:lvl7pPr marL="2743200" algn="l" defTabSz="914400" rtl="0" eaLnBrk="1" latinLnBrk="0" hangingPunct="1">
+              <a:defRPr sz="1800" kern="1200">
+                <a:solidFill>
+                  <a:schemeClr val="lt1"/>
+                </a:solidFill>
+                <a:latin typeface="+mn-lt"/>
+                <a:ea typeface="+mn-ea"/>
+                <a:cs typeface="+mn-cs"/>
+              </a:defRPr>
+            </a:lvl7pPr>
+            <a:lvl8pPr marL="3200400" algn="l" defTabSz="914400" rtl="0" eaLnBrk="1" latinLnBrk="0" hangingPunct="1">
+              <a:defRPr sz="1800" kern="1200">
+                <a:solidFill>
+                  <a:schemeClr val="lt1"/>
+                </a:solidFill>
+                <a:latin typeface="+mn-lt"/>
+                <a:ea typeface="+mn-ea"/>
+                <a:cs typeface="+mn-cs"/>
+              </a:defRPr>
+            </a:lvl8pPr>
+            <a:lvl9pPr marL="3657600" algn="l" defTabSz="914400" rtl="0" eaLnBrk="1" latinLnBrk="0" hangingPunct="1">
+              <a:defRPr sz="1800" kern="1200">
+                <a:solidFill>
+                  <a:schemeClr val="lt1"/>
+                </a:solidFill>
+                <a:latin typeface="+mn-lt"/>
+                <a:ea typeface="+mn-ea"/>
+                <a:cs typeface="+mn-cs"/>
+              </a:defRPr>
+            </a:lvl9pPr>
+          </a:lstStyle>
+          <a:p>
+            <a:pPr algn="ctr"/>
+            <a:endParaRPr lang="en-US"/>
+          </a:p>
+        </p:txBody>
+      </p:sp>
+      <p:sp>
+        <p:nvSpPr>
+          <p:cNvPr id="2" name="TextBox 1">
+            <a:extLst>
+              <a:ext uri="{FF2B5EF4-FFF2-40B4-BE49-F238E27FC236}">
+                <a16:creationId xmlns:a16="http://schemas.microsoft.com/office/drawing/2014/main" id="{3B1FA70A-9416-73B4-1E11-0E922EA8BC51}"/>
+              </a:ext>
+            </a:extLst>
+          </p:cNvPr>
+          <p:cNvSpPr txBox="1"/>
+          <p:nvPr/>
+        </p:nvSpPr>
+        <p:spPr>
+          <a:xfrm>
+            <a:off x="4915228" y="180975"/>
+            <a:ext cx="2361544" cy="584775"/>
+          </a:xfrm>
+          <a:prstGeom prst="rect">
+            <a:avLst/>
+          </a:prstGeom>
+          <a:noFill/>
+        </p:spPr>
+        <p:txBody>
+          <a:bodyPr wrap="none" rtlCol="0">
+            <a:spAutoFit/>
+          </a:bodyPr>
+          <a:lstStyle/>
+          <a:p>
+            <a:r>
+              <a:rPr lang="en-AU" sz="3200" b="1" dirty="0">
+                <a:solidFill>
+                  <a:schemeClr val="bg1"/>
+                </a:solidFill>
+                <a:latin typeface="Times New Roman" panose="02020603050405020304" pitchFamily="18" charset="0"/>
+                <a:ea typeface="STZhongsong" panose="020B0503020204020204" pitchFamily="2" charset="-122"/>
+                <a:cs typeface="Times New Roman" panose="02020603050405020304" pitchFamily="18" charset="0"/>
+              </a:rPr>
+              <a:t>Data Export</a:t>
+            </a:r>
+          </a:p>
+        </p:txBody>
+      </p:sp>
+      <p:sp>
+        <p:nvSpPr>
+          <p:cNvPr id="3" name="Rectangle: Rounded Corners 2">
+            <a:extLst>
+              <a:ext uri="{FF2B5EF4-FFF2-40B4-BE49-F238E27FC236}">
+                <a16:creationId xmlns:a16="http://schemas.microsoft.com/office/drawing/2014/main" id="{B70E874B-BCEB-750D-D0E5-FB2084F3A94E}"/>
+              </a:ext>
+            </a:extLst>
+          </p:cNvPr>
+          <p:cNvSpPr/>
+          <p:nvPr/>
+        </p:nvSpPr>
+        <p:spPr>
+          <a:xfrm>
+            <a:off x="177674" y="1651635"/>
+            <a:ext cx="11804776" cy="5025390"/>
+          </a:xfrm>
+          <a:prstGeom prst="roundRect">
+            <a:avLst>
+              <a:gd name="adj" fmla="val 7257"/>
+            </a:avLst>
+          </a:prstGeom>
+          <a:noFill/>
+          <a:ln>
+            <a:solidFill>
+              <a:srgbClr val="DBA111"/>
+            </a:solidFill>
+          </a:ln>
+        </p:spPr>
+        <p:style>
+          <a:lnRef idx="2">
+            <a:schemeClr val="accent1">
+              <a:shade val="15000"/>
+            </a:schemeClr>
+          </a:lnRef>
+          <a:fillRef idx="1">
+            <a:schemeClr val="accent1"/>
+          </a:fillRef>
+          <a:effectRef idx="0">
+            <a:schemeClr val="accent1"/>
+          </a:effectRef>
+          <a:fontRef idx="minor">
+            <a:schemeClr val="lt1"/>
+          </a:fontRef>
+        </p:style>
+        <p:txBody>
+          <a:bodyPr rtlCol="0" anchor="ctr"/>
+          <a:lstStyle/>
+          <a:p>
+            <a:pPr algn="ctr"/>
+            <a:endParaRPr lang="en-AU"/>
+          </a:p>
+        </p:txBody>
+      </p:sp>
+    </p:spTree>
+    <p:extLst>
+      <p:ext uri="{BB962C8B-B14F-4D97-AF65-F5344CB8AC3E}">
+        <p14:creationId xmlns:p14="http://schemas.microsoft.com/office/powerpoint/2010/main" val="404551277"/>
+      </p:ext>
+    </p:extLst>
+  </p:cSld>
+  <p:clrMapOvr>
+    <a:masterClrMapping/>
+  </p:clrMapOvr>
+</p:sld>
+</file>
+
 <file path=ppt/slides/slide2.xml><?xml version="1.0" encoding="utf-8"?>
 <p:sld xmlns:a="http://schemas.openxmlformats.org/drawingml/2006/main" xmlns:r="http://schemas.openxmlformats.org/officeDocument/2006/relationships" xmlns:p="http://schemas.openxmlformats.org/presentationml/2006/main">
   <p:cSld>
@@ -6903,8 +8854,8 @@
         </p:nvSpPr>
         <p:spPr>
           <a:xfrm>
-            <a:off x="2519076" y="3079816"/>
-            <a:ext cx="7153836" cy="1569660"/>
+            <a:off x="2519076" y="2912927"/>
+            <a:ext cx="7153836" cy="2062103"/>
           </a:xfrm>
           <a:prstGeom prst="rect">
             <a:avLst/>
@@ -6919,965 +8870,209 @@
           <a:p>
             <a:pPr algn="ctr"/>
             <a:r>
-              <a:rPr lang="en-AU" sz="1600" dirty="0">
+              <a:rPr lang="en-NZ" sz="1600" dirty="0">
                 <a:solidFill>
                   <a:schemeClr val="bg1"/>
                 </a:solidFill>
                 <a:latin typeface="Times New Roman" panose="02020603050405020304" pitchFamily="18" charset="0"/>
-                <a:ea typeface="STZhongsong" panose="020B0503020204020204" pitchFamily="2" charset="-122"/>
                 <a:cs typeface="Times New Roman" panose="02020603050405020304" pitchFamily="18" charset="0"/>
               </a:rPr>
-              <a:t>Lorem ipsum </a:t>
-            </a:r>
-            <a:r>
-              <a:rPr lang="en-AU" sz="1600" dirty="0" err="1">
+              <a:t>The Chelsea FC Player Workload &amp; Physical Capability Dashboard provides a comprehensive overview of player performance, tracking key metrics such as speed, heart rate, and distance using GPS data. It highlights priority work areas, monitors recovery trends, and evaluates physical capability through strength, agility, sprinting, and jumping assessments categorized by movement quality and force expression (Isometric/Dynamic). This data-driven approach enables the coaching staff to optimize training, prevent injuries, and enhance player performance throughout the season.</a:t>
+            </a:r>
+            <a:endParaRPr lang="en-AU" sz="1600" dirty="0">
+              <a:solidFill>
+                <a:schemeClr val="bg1"/>
+              </a:solidFill>
+              <a:latin typeface="Times New Roman" panose="02020603050405020304" pitchFamily="18" charset="0"/>
+              <a:ea typeface="STZhongsong" panose="020B0503020204020204" pitchFamily="2" charset="-122"/>
+              <a:cs typeface="Times New Roman" panose="02020603050405020304" pitchFamily="18" charset="0"/>
+            </a:endParaRPr>
+          </a:p>
+        </p:txBody>
+      </p:sp>
+      <p:sp>
+        <p:nvSpPr>
+          <p:cNvPr id="8" name="TextBox 7">
+            <a:extLst>
+              <a:ext uri="{FF2B5EF4-FFF2-40B4-BE49-F238E27FC236}">
+                <a16:creationId xmlns:a16="http://schemas.microsoft.com/office/drawing/2014/main" id="{792F4A82-5544-4108-2B7E-2419E92A6BDB}"/>
+              </a:ext>
+            </a:extLst>
+          </p:cNvPr>
+          <p:cNvSpPr txBox="1"/>
+          <p:nvPr/>
+        </p:nvSpPr>
+        <p:spPr>
+          <a:xfrm>
+            <a:off x="6257755" y="6536191"/>
+            <a:ext cx="1871937" cy="276999"/>
+          </a:xfrm>
+          <a:prstGeom prst="rect">
+            <a:avLst/>
+          </a:prstGeom>
+          <a:noFill/>
+        </p:spPr>
+        <p:txBody>
+          <a:bodyPr wrap="square" rtlCol="0">
+            <a:spAutoFit/>
+          </a:bodyPr>
+          <a:lstStyle/>
+          <a:p>
+            <a:pPr algn="ctr"/>
+            <a:r>
+              <a:rPr lang="en-NZ" sz="1200" dirty="0">
                 <a:solidFill>
                   <a:schemeClr val="bg1"/>
                 </a:solidFill>
                 <a:latin typeface="Times New Roman" panose="02020603050405020304" pitchFamily="18" charset="0"/>
-                <a:ea typeface="STZhongsong" panose="020B0503020204020204" pitchFamily="2" charset="-122"/>
                 <a:cs typeface="Times New Roman" panose="02020603050405020304" pitchFamily="18" charset="0"/>
               </a:rPr>
-              <a:t>dolor</a:t>
-            </a:r>
-            <a:r>
-              <a:rPr lang="en-AU" sz="1600" dirty="0">
+              <a:t>@Jeffreyjose29</a:t>
+            </a:r>
+            <a:endParaRPr lang="en-AU" sz="1200" dirty="0">
+              <a:solidFill>
+                <a:schemeClr val="bg1"/>
+              </a:solidFill>
+              <a:latin typeface="Times New Roman" panose="02020603050405020304" pitchFamily="18" charset="0"/>
+              <a:ea typeface="STZhongsong" panose="020B0503020204020204" pitchFamily="2" charset="-122"/>
+              <a:cs typeface="Times New Roman" panose="02020603050405020304" pitchFamily="18" charset="0"/>
+            </a:endParaRPr>
+          </a:p>
+        </p:txBody>
+      </p:sp>
+      <p:sp>
+        <p:nvSpPr>
+          <p:cNvPr id="9" name="TextBox 8">
+            <a:extLst>
+              <a:ext uri="{FF2B5EF4-FFF2-40B4-BE49-F238E27FC236}">
+                <a16:creationId xmlns:a16="http://schemas.microsoft.com/office/drawing/2014/main" id="{C4D63846-156F-5A5D-8280-9ED8523D35A6}"/>
+              </a:ext>
+            </a:extLst>
+          </p:cNvPr>
+          <p:cNvSpPr txBox="1"/>
+          <p:nvPr/>
+        </p:nvSpPr>
+        <p:spPr>
+          <a:xfrm>
+            <a:off x="4196625" y="6554479"/>
+            <a:ext cx="1871937" cy="276999"/>
+          </a:xfrm>
+          <a:prstGeom prst="rect">
+            <a:avLst/>
+          </a:prstGeom>
+          <a:noFill/>
+        </p:spPr>
+        <p:txBody>
+          <a:bodyPr wrap="square" rtlCol="0">
+            <a:spAutoFit/>
+          </a:bodyPr>
+          <a:lstStyle/>
+          <a:p>
+            <a:pPr algn="ctr"/>
+            <a:r>
+              <a:rPr lang="en-NZ" sz="1200" dirty="0">
                 <a:solidFill>
                   <a:schemeClr val="bg1"/>
                 </a:solidFill>
                 <a:latin typeface="Times New Roman" panose="02020603050405020304" pitchFamily="18" charset="0"/>
-                <a:ea typeface="STZhongsong" panose="020B0503020204020204" pitchFamily="2" charset="-122"/>
                 <a:cs typeface="Times New Roman" panose="02020603050405020304" pitchFamily="18" charset="0"/>
               </a:rPr>
-              <a:t> sit </a:t>
-            </a:r>
-            <a:r>
-              <a:rPr lang="en-AU" sz="1600" dirty="0" err="1">
-                <a:solidFill>
-                  <a:schemeClr val="bg1"/>
-                </a:solidFill>
-                <a:latin typeface="Times New Roman" panose="02020603050405020304" pitchFamily="18" charset="0"/>
-                <a:ea typeface="STZhongsong" panose="020B0503020204020204" pitchFamily="2" charset="-122"/>
-                <a:cs typeface="Times New Roman" panose="02020603050405020304" pitchFamily="18" charset="0"/>
-              </a:rPr>
-              <a:t>amet</a:t>
-            </a:r>
-            <a:r>
-              <a:rPr lang="en-AU" sz="1600" dirty="0">
-                <a:solidFill>
-                  <a:schemeClr val="bg1"/>
-                </a:solidFill>
-                <a:latin typeface="Times New Roman" panose="02020603050405020304" pitchFamily="18" charset="0"/>
-                <a:ea typeface="STZhongsong" panose="020B0503020204020204" pitchFamily="2" charset="-122"/>
-                <a:cs typeface="Times New Roman" panose="02020603050405020304" pitchFamily="18" charset="0"/>
-              </a:rPr>
-              <a:t>, </a:t>
-            </a:r>
-            <a:r>
-              <a:rPr lang="en-AU" sz="1600" dirty="0" err="1">
-                <a:solidFill>
-                  <a:schemeClr val="bg1"/>
-                </a:solidFill>
-                <a:latin typeface="Times New Roman" panose="02020603050405020304" pitchFamily="18" charset="0"/>
-                <a:ea typeface="STZhongsong" panose="020B0503020204020204" pitchFamily="2" charset="-122"/>
-                <a:cs typeface="Times New Roman" panose="02020603050405020304" pitchFamily="18" charset="0"/>
-              </a:rPr>
-              <a:t>consectetur</a:t>
-            </a:r>
-            <a:r>
-              <a:rPr lang="en-AU" sz="1600" dirty="0">
-                <a:solidFill>
-                  <a:schemeClr val="bg1"/>
-                </a:solidFill>
-                <a:latin typeface="Times New Roman" panose="02020603050405020304" pitchFamily="18" charset="0"/>
-                <a:ea typeface="STZhongsong" panose="020B0503020204020204" pitchFamily="2" charset="-122"/>
-                <a:cs typeface="Times New Roman" panose="02020603050405020304" pitchFamily="18" charset="0"/>
-              </a:rPr>
-              <a:t> </a:t>
-            </a:r>
-            <a:r>
-              <a:rPr lang="en-AU" sz="1600" dirty="0" err="1">
-                <a:solidFill>
-                  <a:schemeClr val="bg1"/>
-                </a:solidFill>
-                <a:latin typeface="Times New Roman" panose="02020603050405020304" pitchFamily="18" charset="0"/>
-                <a:ea typeface="STZhongsong" panose="020B0503020204020204" pitchFamily="2" charset="-122"/>
-                <a:cs typeface="Times New Roman" panose="02020603050405020304" pitchFamily="18" charset="0"/>
-              </a:rPr>
-              <a:t>adipiscing</a:t>
-            </a:r>
-            <a:r>
-              <a:rPr lang="en-AU" sz="1600" dirty="0">
-                <a:solidFill>
-                  <a:schemeClr val="bg1"/>
-                </a:solidFill>
-                <a:latin typeface="Times New Roman" panose="02020603050405020304" pitchFamily="18" charset="0"/>
-                <a:ea typeface="STZhongsong" panose="020B0503020204020204" pitchFamily="2" charset="-122"/>
-                <a:cs typeface="Times New Roman" panose="02020603050405020304" pitchFamily="18" charset="0"/>
-              </a:rPr>
-              <a:t> </a:t>
-            </a:r>
-            <a:r>
-              <a:rPr lang="en-AU" sz="1600" dirty="0" err="1">
-                <a:solidFill>
-                  <a:schemeClr val="bg1"/>
-                </a:solidFill>
-                <a:latin typeface="Times New Roman" panose="02020603050405020304" pitchFamily="18" charset="0"/>
-                <a:ea typeface="STZhongsong" panose="020B0503020204020204" pitchFamily="2" charset="-122"/>
-                <a:cs typeface="Times New Roman" panose="02020603050405020304" pitchFamily="18" charset="0"/>
-              </a:rPr>
-              <a:t>elit</a:t>
-            </a:r>
-            <a:r>
-              <a:rPr lang="en-AU" sz="1600" dirty="0">
-                <a:solidFill>
-                  <a:schemeClr val="bg1"/>
-                </a:solidFill>
-                <a:latin typeface="Times New Roman" panose="02020603050405020304" pitchFamily="18" charset="0"/>
-                <a:ea typeface="STZhongsong" panose="020B0503020204020204" pitchFamily="2" charset="-122"/>
-                <a:cs typeface="Times New Roman" panose="02020603050405020304" pitchFamily="18" charset="0"/>
-              </a:rPr>
-              <a:t>, sed do </a:t>
-            </a:r>
-            <a:r>
-              <a:rPr lang="en-AU" sz="1600" dirty="0" err="1">
-                <a:solidFill>
-                  <a:schemeClr val="bg1"/>
-                </a:solidFill>
-                <a:latin typeface="Times New Roman" panose="02020603050405020304" pitchFamily="18" charset="0"/>
-                <a:ea typeface="STZhongsong" panose="020B0503020204020204" pitchFamily="2" charset="-122"/>
-                <a:cs typeface="Times New Roman" panose="02020603050405020304" pitchFamily="18" charset="0"/>
-              </a:rPr>
-              <a:t>eiusmod</a:t>
-            </a:r>
-            <a:r>
-              <a:rPr lang="en-AU" sz="1600" dirty="0">
-                <a:solidFill>
-                  <a:schemeClr val="bg1"/>
-                </a:solidFill>
-                <a:latin typeface="Times New Roman" panose="02020603050405020304" pitchFamily="18" charset="0"/>
-                <a:ea typeface="STZhongsong" panose="020B0503020204020204" pitchFamily="2" charset="-122"/>
-                <a:cs typeface="Times New Roman" panose="02020603050405020304" pitchFamily="18" charset="0"/>
-              </a:rPr>
-              <a:t> </a:t>
-            </a:r>
-            <a:r>
-              <a:rPr lang="en-AU" sz="1600" dirty="0" err="1">
-                <a:solidFill>
-                  <a:schemeClr val="bg1"/>
-                </a:solidFill>
-                <a:latin typeface="Times New Roman" panose="02020603050405020304" pitchFamily="18" charset="0"/>
-                <a:ea typeface="STZhongsong" panose="020B0503020204020204" pitchFamily="2" charset="-122"/>
-                <a:cs typeface="Times New Roman" panose="02020603050405020304" pitchFamily="18" charset="0"/>
-              </a:rPr>
-              <a:t>tempor</a:t>
-            </a:r>
-            <a:r>
-              <a:rPr lang="en-AU" sz="1600" dirty="0">
-                <a:solidFill>
-                  <a:schemeClr val="bg1"/>
-                </a:solidFill>
-                <a:latin typeface="Times New Roman" panose="02020603050405020304" pitchFamily="18" charset="0"/>
-                <a:ea typeface="STZhongsong" panose="020B0503020204020204" pitchFamily="2" charset="-122"/>
-                <a:cs typeface="Times New Roman" panose="02020603050405020304" pitchFamily="18" charset="0"/>
-              </a:rPr>
-              <a:t> </a:t>
-            </a:r>
-            <a:r>
-              <a:rPr lang="en-AU" sz="1600" dirty="0" err="1">
-                <a:solidFill>
-                  <a:schemeClr val="bg1"/>
-                </a:solidFill>
-                <a:latin typeface="Times New Roman" panose="02020603050405020304" pitchFamily="18" charset="0"/>
-                <a:ea typeface="STZhongsong" panose="020B0503020204020204" pitchFamily="2" charset="-122"/>
-                <a:cs typeface="Times New Roman" panose="02020603050405020304" pitchFamily="18" charset="0"/>
-              </a:rPr>
-              <a:t>incididunt</a:t>
-            </a:r>
-            <a:r>
-              <a:rPr lang="en-AU" sz="1600" dirty="0">
-                <a:solidFill>
-                  <a:schemeClr val="bg1"/>
-                </a:solidFill>
-                <a:latin typeface="Times New Roman" panose="02020603050405020304" pitchFamily="18" charset="0"/>
-                <a:ea typeface="STZhongsong" panose="020B0503020204020204" pitchFamily="2" charset="-122"/>
-                <a:cs typeface="Times New Roman" panose="02020603050405020304" pitchFamily="18" charset="0"/>
-              </a:rPr>
-              <a:t> </a:t>
-            </a:r>
-            <a:r>
-              <a:rPr lang="en-AU" sz="1600" dirty="0" err="1">
-                <a:solidFill>
-                  <a:schemeClr val="bg1"/>
-                </a:solidFill>
-                <a:latin typeface="Times New Roman" panose="02020603050405020304" pitchFamily="18" charset="0"/>
-                <a:ea typeface="STZhongsong" panose="020B0503020204020204" pitchFamily="2" charset="-122"/>
-                <a:cs typeface="Times New Roman" panose="02020603050405020304" pitchFamily="18" charset="0"/>
-              </a:rPr>
-              <a:t>ut</a:t>
-            </a:r>
-            <a:r>
-              <a:rPr lang="en-AU" sz="1600" dirty="0">
-                <a:solidFill>
-                  <a:schemeClr val="bg1"/>
-                </a:solidFill>
-                <a:latin typeface="Times New Roman" panose="02020603050405020304" pitchFamily="18" charset="0"/>
-                <a:ea typeface="STZhongsong" panose="020B0503020204020204" pitchFamily="2" charset="-122"/>
-                <a:cs typeface="Times New Roman" panose="02020603050405020304" pitchFamily="18" charset="0"/>
-              </a:rPr>
-              <a:t> labore et dolore magna </a:t>
-            </a:r>
-            <a:r>
-              <a:rPr lang="en-AU" sz="1600" dirty="0" err="1">
-                <a:solidFill>
-                  <a:schemeClr val="bg1"/>
-                </a:solidFill>
-                <a:latin typeface="Times New Roman" panose="02020603050405020304" pitchFamily="18" charset="0"/>
-                <a:ea typeface="STZhongsong" panose="020B0503020204020204" pitchFamily="2" charset="-122"/>
-                <a:cs typeface="Times New Roman" panose="02020603050405020304" pitchFamily="18" charset="0"/>
-              </a:rPr>
-              <a:t>aliqua</a:t>
-            </a:r>
-            <a:r>
-              <a:rPr lang="en-AU" sz="1600" dirty="0">
-                <a:solidFill>
-                  <a:schemeClr val="bg1"/>
-                </a:solidFill>
-                <a:latin typeface="Times New Roman" panose="02020603050405020304" pitchFamily="18" charset="0"/>
-                <a:ea typeface="STZhongsong" panose="020B0503020204020204" pitchFamily="2" charset="-122"/>
-                <a:cs typeface="Times New Roman" panose="02020603050405020304" pitchFamily="18" charset="0"/>
-              </a:rPr>
-              <a:t>. Ut </a:t>
-            </a:r>
-            <a:r>
-              <a:rPr lang="en-AU" sz="1600" dirty="0" err="1">
-                <a:solidFill>
-                  <a:schemeClr val="bg1"/>
-                </a:solidFill>
-                <a:latin typeface="Times New Roman" panose="02020603050405020304" pitchFamily="18" charset="0"/>
-                <a:ea typeface="STZhongsong" panose="020B0503020204020204" pitchFamily="2" charset="-122"/>
-                <a:cs typeface="Times New Roman" panose="02020603050405020304" pitchFamily="18" charset="0"/>
-              </a:rPr>
-              <a:t>enim</a:t>
-            </a:r>
-            <a:r>
-              <a:rPr lang="en-AU" sz="1600" dirty="0">
-                <a:solidFill>
-                  <a:schemeClr val="bg1"/>
-                </a:solidFill>
-                <a:latin typeface="Times New Roman" panose="02020603050405020304" pitchFamily="18" charset="0"/>
-                <a:ea typeface="STZhongsong" panose="020B0503020204020204" pitchFamily="2" charset="-122"/>
-                <a:cs typeface="Times New Roman" panose="02020603050405020304" pitchFamily="18" charset="0"/>
-              </a:rPr>
-              <a:t> ad minim </a:t>
-            </a:r>
-            <a:r>
-              <a:rPr lang="en-AU" sz="1600" dirty="0" err="1">
-                <a:solidFill>
-                  <a:schemeClr val="bg1"/>
-                </a:solidFill>
-                <a:latin typeface="Times New Roman" panose="02020603050405020304" pitchFamily="18" charset="0"/>
-                <a:ea typeface="STZhongsong" panose="020B0503020204020204" pitchFamily="2" charset="-122"/>
-                <a:cs typeface="Times New Roman" panose="02020603050405020304" pitchFamily="18" charset="0"/>
-              </a:rPr>
-              <a:t>veniam</a:t>
-            </a:r>
-            <a:r>
-              <a:rPr lang="en-AU" sz="1600" dirty="0">
-                <a:solidFill>
-                  <a:schemeClr val="bg1"/>
-                </a:solidFill>
-                <a:latin typeface="Times New Roman" panose="02020603050405020304" pitchFamily="18" charset="0"/>
-                <a:ea typeface="STZhongsong" panose="020B0503020204020204" pitchFamily="2" charset="-122"/>
-                <a:cs typeface="Times New Roman" panose="02020603050405020304" pitchFamily="18" charset="0"/>
-              </a:rPr>
-              <a:t>, </a:t>
-            </a:r>
-            <a:r>
-              <a:rPr lang="en-AU" sz="1600" dirty="0" err="1">
-                <a:solidFill>
-                  <a:schemeClr val="bg1"/>
-                </a:solidFill>
-                <a:latin typeface="Times New Roman" panose="02020603050405020304" pitchFamily="18" charset="0"/>
-                <a:ea typeface="STZhongsong" panose="020B0503020204020204" pitchFamily="2" charset="-122"/>
-                <a:cs typeface="Times New Roman" panose="02020603050405020304" pitchFamily="18" charset="0"/>
-              </a:rPr>
-              <a:t>quis</a:t>
-            </a:r>
-            <a:r>
-              <a:rPr lang="en-AU" sz="1600" dirty="0">
-                <a:solidFill>
-                  <a:schemeClr val="bg1"/>
-                </a:solidFill>
-                <a:latin typeface="Times New Roman" panose="02020603050405020304" pitchFamily="18" charset="0"/>
-                <a:ea typeface="STZhongsong" panose="020B0503020204020204" pitchFamily="2" charset="-122"/>
-                <a:cs typeface="Times New Roman" panose="02020603050405020304" pitchFamily="18" charset="0"/>
-              </a:rPr>
-              <a:t> </a:t>
-            </a:r>
-            <a:r>
-              <a:rPr lang="en-AU" sz="1600" dirty="0" err="1">
-                <a:solidFill>
-                  <a:schemeClr val="bg1"/>
-                </a:solidFill>
-                <a:latin typeface="Times New Roman" panose="02020603050405020304" pitchFamily="18" charset="0"/>
-                <a:ea typeface="STZhongsong" panose="020B0503020204020204" pitchFamily="2" charset="-122"/>
-                <a:cs typeface="Times New Roman" panose="02020603050405020304" pitchFamily="18" charset="0"/>
-              </a:rPr>
-              <a:t>nostrud</a:t>
-            </a:r>
-            <a:r>
-              <a:rPr lang="en-AU" sz="1600" dirty="0">
-                <a:solidFill>
-                  <a:schemeClr val="bg1"/>
-                </a:solidFill>
-                <a:latin typeface="Times New Roman" panose="02020603050405020304" pitchFamily="18" charset="0"/>
-                <a:ea typeface="STZhongsong" panose="020B0503020204020204" pitchFamily="2" charset="-122"/>
-                <a:cs typeface="Times New Roman" panose="02020603050405020304" pitchFamily="18" charset="0"/>
-              </a:rPr>
-              <a:t> exercitation </a:t>
-            </a:r>
-            <a:r>
-              <a:rPr lang="en-AU" sz="1600" dirty="0" err="1">
-                <a:solidFill>
-                  <a:schemeClr val="bg1"/>
-                </a:solidFill>
-                <a:latin typeface="Times New Roman" panose="02020603050405020304" pitchFamily="18" charset="0"/>
-                <a:ea typeface="STZhongsong" panose="020B0503020204020204" pitchFamily="2" charset="-122"/>
-                <a:cs typeface="Times New Roman" panose="02020603050405020304" pitchFamily="18" charset="0"/>
-              </a:rPr>
-              <a:t>ullamco</a:t>
-            </a:r>
-            <a:r>
-              <a:rPr lang="en-AU" sz="1600" dirty="0">
-                <a:solidFill>
-                  <a:schemeClr val="bg1"/>
-                </a:solidFill>
-                <a:latin typeface="Times New Roman" panose="02020603050405020304" pitchFamily="18" charset="0"/>
-                <a:ea typeface="STZhongsong" panose="020B0503020204020204" pitchFamily="2" charset="-122"/>
-                <a:cs typeface="Times New Roman" panose="02020603050405020304" pitchFamily="18" charset="0"/>
-              </a:rPr>
-              <a:t> </a:t>
-            </a:r>
-            <a:r>
-              <a:rPr lang="en-AU" sz="1600" dirty="0" err="1">
-                <a:solidFill>
-                  <a:schemeClr val="bg1"/>
-                </a:solidFill>
-                <a:latin typeface="Times New Roman" panose="02020603050405020304" pitchFamily="18" charset="0"/>
-                <a:ea typeface="STZhongsong" panose="020B0503020204020204" pitchFamily="2" charset="-122"/>
-                <a:cs typeface="Times New Roman" panose="02020603050405020304" pitchFamily="18" charset="0"/>
-              </a:rPr>
-              <a:t>laboris</a:t>
-            </a:r>
-            <a:r>
-              <a:rPr lang="en-AU" sz="1600" dirty="0">
-                <a:solidFill>
-                  <a:schemeClr val="bg1"/>
-                </a:solidFill>
-                <a:latin typeface="Times New Roman" panose="02020603050405020304" pitchFamily="18" charset="0"/>
-                <a:ea typeface="STZhongsong" panose="020B0503020204020204" pitchFamily="2" charset="-122"/>
-                <a:cs typeface="Times New Roman" panose="02020603050405020304" pitchFamily="18" charset="0"/>
-              </a:rPr>
-              <a:t> nisi </a:t>
-            </a:r>
-            <a:r>
-              <a:rPr lang="en-AU" sz="1600" dirty="0" err="1">
-                <a:solidFill>
-                  <a:schemeClr val="bg1"/>
-                </a:solidFill>
-                <a:latin typeface="Times New Roman" panose="02020603050405020304" pitchFamily="18" charset="0"/>
-                <a:ea typeface="STZhongsong" panose="020B0503020204020204" pitchFamily="2" charset="-122"/>
-                <a:cs typeface="Times New Roman" panose="02020603050405020304" pitchFamily="18" charset="0"/>
-              </a:rPr>
-              <a:t>ut</a:t>
-            </a:r>
-            <a:r>
-              <a:rPr lang="en-AU" sz="1600" dirty="0">
-                <a:solidFill>
-                  <a:schemeClr val="bg1"/>
-                </a:solidFill>
-                <a:latin typeface="Times New Roman" panose="02020603050405020304" pitchFamily="18" charset="0"/>
-                <a:ea typeface="STZhongsong" panose="020B0503020204020204" pitchFamily="2" charset="-122"/>
-                <a:cs typeface="Times New Roman" panose="02020603050405020304" pitchFamily="18" charset="0"/>
-              </a:rPr>
-              <a:t> </a:t>
-            </a:r>
-            <a:r>
-              <a:rPr lang="en-AU" sz="1600" dirty="0" err="1">
-                <a:solidFill>
-                  <a:schemeClr val="bg1"/>
-                </a:solidFill>
-                <a:latin typeface="Times New Roman" panose="02020603050405020304" pitchFamily="18" charset="0"/>
-                <a:ea typeface="STZhongsong" panose="020B0503020204020204" pitchFamily="2" charset="-122"/>
-                <a:cs typeface="Times New Roman" panose="02020603050405020304" pitchFamily="18" charset="0"/>
-              </a:rPr>
-              <a:t>aliquip</a:t>
-            </a:r>
-            <a:r>
-              <a:rPr lang="en-AU" sz="1600" dirty="0">
-                <a:solidFill>
-                  <a:schemeClr val="bg1"/>
-                </a:solidFill>
-                <a:latin typeface="Times New Roman" panose="02020603050405020304" pitchFamily="18" charset="0"/>
-                <a:ea typeface="STZhongsong" panose="020B0503020204020204" pitchFamily="2" charset="-122"/>
-                <a:cs typeface="Times New Roman" panose="02020603050405020304" pitchFamily="18" charset="0"/>
-              </a:rPr>
-              <a:t> ex </a:t>
-            </a:r>
-            <a:r>
-              <a:rPr lang="en-AU" sz="1600" dirty="0" err="1">
-                <a:solidFill>
-                  <a:schemeClr val="bg1"/>
-                </a:solidFill>
-                <a:latin typeface="Times New Roman" panose="02020603050405020304" pitchFamily="18" charset="0"/>
-                <a:ea typeface="STZhongsong" panose="020B0503020204020204" pitchFamily="2" charset="-122"/>
-                <a:cs typeface="Times New Roman" panose="02020603050405020304" pitchFamily="18" charset="0"/>
-              </a:rPr>
-              <a:t>ea</a:t>
-            </a:r>
-            <a:r>
-              <a:rPr lang="en-AU" sz="1600" dirty="0">
-                <a:solidFill>
-                  <a:schemeClr val="bg1"/>
-                </a:solidFill>
-                <a:latin typeface="Times New Roman" panose="02020603050405020304" pitchFamily="18" charset="0"/>
-                <a:ea typeface="STZhongsong" panose="020B0503020204020204" pitchFamily="2" charset="-122"/>
-                <a:cs typeface="Times New Roman" panose="02020603050405020304" pitchFamily="18" charset="0"/>
-              </a:rPr>
-              <a:t> </a:t>
-            </a:r>
-            <a:r>
-              <a:rPr lang="en-AU" sz="1600" dirty="0" err="1">
-                <a:solidFill>
-                  <a:schemeClr val="bg1"/>
-                </a:solidFill>
-                <a:latin typeface="Times New Roman" panose="02020603050405020304" pitchFamily="18" charset="0"/>
-                <a:ea typeface="STZhongsong" panose="020B0503020204020204" pitchFamily="2" charset="-122"/>
-                <a:cs typeface="Times New Roman" panose="02020603050405020304" pitchFamily="18" charset="0"/>
-              </a:rPr>
-              <a:t>commodo</a:t>
-            </a:r>
-            <a:r>
-              <a:rPr lang="en-AU" sz="1600" dirty="0">
-                <a:solidFill>
-                  <a:schemeClr val="bg1"/>
-                </a:solidFill>
-                <a:latin typeface="Times New Roman" panose="02020603050405020304" pitchFamily="18" charset="0"/>
-                <a:ea typeface="STZhongsong" panose="020B0503020204020204" pitchFamily="2" charset="-122"/>
-                <a:cs typeface="Times New Roman" panose="02020603050405020304" pitchFamily="18" charset="0"/>
-              </a:rPr>
-              <a:t> </a:t>
-            </a:r>
-            <a:r>
-              <a:rPr lang="en-AU" sz="1600" dirty="0" err="1">
-                <a:solidFill>
-                  <a:schemeClr val="bg1"/>
-                </a:solidFill>
-                <a:latin typeface="Times New Roman" panose="02020603050405020304" pitchFamily="18" charset="0"/>
-                <a:ea typeface="STZhongsong" panose="020B0503020204020204" pitchFamily="2" charset="-122"/>
-                <a:cs typeface="Times New Roman" panose="02020603050405020304" pitchFamily="18" charset="0"/>
-              </a:rPr>
-              <a:t>consequat</a:t>
-            </a:r>
-            <a:r>
-              <a:rPr lang="en-AU" sz="1600" dirty="0">
-                <a:solidFill>
-                  <a:schemeClr val="bg1"/>
-                </a:solidFill>
-                <a:latin typeface="Times New Roman" panose="02020603050405020304" pitchFamily="18" charset="0"/>
-                <a:ea typeface="STZhongsong" panose="020B0503020204020204" pitchFamily="2" charset="-122"/>
-                <a:cs typeface="Times New Roman" panose="02020603050405020304" pitchFamily="18" charset="0"/>
-              </a:rPr>
-              <a:t>. Duis </a:t>
-            </a:r>
-            <a:r>
-              <a:rPr lang="en-AU" sz="1600" dirty="0" err="1">
-                <a:solidFill>
-                  <a:schemeClr val="bg1"/>
-                </a:solidFill>
-                <a:latin typeface="Times New Roman" panose="02020603050405020304" pitchFamily="18" charset="0"/>
-                <a:ea typeface="STZhongsong" panose="020B0503020204020204" pitchFamily="2" charset="-122"/>
-                <a:cs typeface="Times New Roman" panose="02020603050405020304" pitchFamily="18" charset="0"/>
-              </a:rPr>
-              <a:t>aute</a:t>
-            </a:r>
-            <a:r>
-              <a:rPr lang="en-AU" sz="1600" dirty="0">
-                <a:solidFill>
-                  <a:schemeClr val="bg1"/>
-                </a:solidFill>
-                <a:latin typeface="Times New Roman" panose="02020603050405020304" pitchFamily="18" charset="0"/>
-                <a:ea typeface="STZhongsong" panose="020B0503020204020204" pitchFamily="2" charset="-122"/>
-                <a:cs typeface="Times New Roman" panose="02020603050405020304" pitchFamily="18" charset="0"/>
-              </a:rPr>
-              <a:t> </a:t>
-            </a:r>
-            <a:r>
-              <a:rPr lang="en-AU" sz="1600" dirty="0" err="1">
-                <a:solidFill>
-                  <a:schemeClr val="bg1"/>
-                </a:solidFill>
-                <a:latin typeface="Times New Roman" panose="02020603050405020304" pitchFamily="18" charset="0"/>
-                <a:ea typeface="STZhongsong" panose="020B0503020204020204" pitchFamily="2" charset="-122"/>
-                <a:cs typeface="Times New Roman" panose="02020603050405020304" pitchFamily="18" charset="0"/>
-              </a:rPr>
-              <a:t>irure</a:t>
-            </a:r>
-            <a:r>
-              <a:rPr lang="en-AU" sz="1600" dirty="0">
-                <a:solidFill>
-                  <a:schemeClr val="bg1"/>
-                </a:solidFill>
-                <a:latin typeface="Times New Roman" panose="02020603050405020304" pitchFamily="18" charset="0"/>
-                <a:ea typeface="STZhongsong" panose="020B0503020204020204" pitchFamily="2" charset="-122"/>
-                <a:cs typeface="Times New Roman" panose="02020603050405020304" pitchFamily="18" charset="0"/>
-              </a:rPr>
-              <a:t> </a:t>
-            </a:r>
-            <a:r>
-              <a:rPr lang="en-AU" sz="1600" dirty="0" err="1">
-                <a:solidFill>
-                  <a:schemeClr val="bg1"/>
-                </a:solidFill>
-                <a:latin typeface="Times New Roman" panose="02020603050405020304" pitchFamily="18" charset="0"/>
-                <a:ea typeface="STZhongsong" panose="020B0503020204020204" pitchFamily="2" charset="-122"/>
-                <a:cs typeface="Times New Roman" panose="02020603050405020304" pitchFamily="18" charset="0"/>
-              </a:rPr>
-              <a:t>dolor</a:t>
-            </a:r>
-            <a:r>
-              <a:rPr lang="en-AU" sz="1600" dirty="0">
-                <a:solidFill>
-                  <a:schemeClr val="bg1"/>
-                </a:solidFill>
-                <a:latin typeface="Times New Roman" panose="02020603050405020304" pitchFamily="18" charset="0"/>
-                <a:ea typeface="STZhongsong" panose="020B0503020204020204" pitchFamily="2" charset="-122"/>
-                <a:cs typeface="Times New Roman" panose="02020603050405020304" pitchFamily="18" charset="0"/>
-              </a:rPr>
-              <a:t> in </a:t>
-            </a:r>
-            <a:r>
-              <a:rPr lang="en-AU" sz="1600" dirty="0" err="1">
-                <a:solidFill>
-                  <a:schemeClr val="bg1"/>
-                </a:solidFill>
-                <a:latin typeface="Times New Roman" panose="02020603050405020304" pitchFamily="18" charset="0"/>
-                <a:ea typeface="STZhongsong" panose="020B0503020204020204" pitchFamily="2" charset="-122"/>
-                <a:cs typeface="Times New Roman" panose="02020603050405020304" pitchFamily="18" charset="0"/>
-              </a:rPr>
-              <a:t>reprehenderit</a:t>
-            </a:r>
-            <a:r>
-              <a:rPr lang="en-AU" sz="1600" dirty="0">
-                <a:solidFill>
-                  <a:schemeClr val="bg1"/>
-                </a:solidFill>
-                <a:latin typeface="Times New Roman" panose="02020603050405020304" pitchFamily="18" charset="0"/>
-                <a:ea typeface="STZhongsong" panose="020B0503020204020204" pitchFamily="2" charset="-122"/>
-                <a:cs typeface="Times New Roman" panose="02020603050405020304" pitchFamily="18" charset="0"/>
-              </a:rPr>
-              <a:t> in </a:t>
-            </a:r>
-            <a:r>
-              <a:rPr lang="en-AU" sz="1600" dirty="0" err="1">
-                <a:solidFill>
-                  <a:schemeClr val="bg1"/>
-                </a:solidFill>
-                <a:latin typeface="Times New Roman" panose="02020603050405020304" pitchFamily="18" charset="0"/>
-                <a:ea typeface="STZhongsong" panose="020B0503020204020204" pitchFamily="2" charset="-122"/>
-                <a:cs typeface="Times New Roman" panose="02020603050405020304" pitchFamily="18" charset="0"/>
-              </a:rPr>
-              <a:t>voluptate</a:t>
-            </a:r>
-            <a:r>
-              <a:rPr lang="en-AU" sz="1600" dirty="0">
-                <a:solidFill>
-                  <a:schemeClr val="bg1"/>
-                </a:solidFill>
-                <a:latin typeface="Times New Roman" panose="02020603050405020304" pitchFamily="18" charset="0"/>
-                <a:ea typeface="STZhongsong" panose="020B0503020204020204" pitchFamily="2" charset="-122"/>
-                <a:cs typeface="Times New Roman" panose="02020603050405020304" pitchFamily="18" charset="0"/>
-              </a:rPr>
-              <a:t> </a:t>
-            </a:r>
-            <a:r>
-              <a:rPr lang="en-AU" sz="1600" dirty="0" err="1">
-                <a:solidFill>
-                  <a:schemeClr val="bg1"/>
-                </a:solidFill>
-                <a:latin typeface="Times New Roman" panose="02020603050405020304" pitchFamily="18" charset="0"/>
-                <a:ea typeface="STZhongsong" panose="020B0503020204020204" pitchFamily="2" charset="-122"/>
-                <a:cs typeface="Times New Roman" panose="02020603050405020304" pitchFamily="18" charset="0"/>
-              </a:rPr>
-              <a:t>velit</a:t>
-            </a:r>
-            <a:r>
-              <a:rPr lang="en-AU" sz="1600" dirty="0">
-                <a:solidFill>
-                  <a:schemeClr val="bg1"/>
-                </a:solidFill>
-                <a:latin typeface="Times New Roman" panose="02020603050405020304" pitchFamily="18" charset="0"/>
-                <a:ea typeface="STZhongsong" panose="020B0503020204020204" pitchFamily="2" charset="-122"/>
-                <a:cs typeface="Times New Roman" panose="02020603050405020304" pitchFamily="18" charset="0"/>
-              </a:rPr>
-              <a:t> </a:t>
-            </a:r>
-            <a:r>
-              <a:rPr lang="en-AU" sz="1600" dirty="0" err="1">
-                <a:solidFill>
-                  <a:schemeClr val="bg1"/>
-                </a:solidFill>
-                <a:latin typeface="Times New Roman" panose="02020603050405020304" pitchFamily="18" charset="0"/>
-                <a:ea typeface="STZhongsong" panose="020B0503020204020204" pitchFamily="2" charset="-122"/>
-                <a:cs typeface="Times New Roman" panose="02020603050405020304" pitchFamily="18" charset="0"/>
-              </a:rPr>
-              <a:t>esse</a:t>
-            </a:r>
-            <a:r>
-              <a:rPr lang="en-AU" sz="1600" dirty="0">
-                <a:solidFill>
-                  <a:schemeClr val="bg1"/>
-                </a:solidFill>
-                <a:latin typeface="Times New Roman" panose="02020603050405020304" pitchFamily="18" charset="0"/>
-                <a:ea typeface="STZhongsong" panose="020B0503020204020204" pitchFamily="2" charset="-122"/>
-                <a:cs typeface="Times New Roman" panose="02020603050405020304" pitchFamily="18" charset="0"/>
-              </a:rPr>
-              <a:t> </a:t>
-            </a:r>
-            <a:r>
-              <a:rPr lang="en-AU" sz="1600" dirty="0" err="1">
-                <a:solidFill>
-                  <a:schemeClr val="bg1"/>
-                </a:solidFill>
-                <a:latin typeface="Times New Roman" panose="02020603050405020304" pitchFamily="18" charset="0"/>
-                <a:ea typeface="STZhongsong" panose="020B0503020204020204" pitchFamily="2" charset="-122"/>
-                <a:cs typeface="Times New Roman" panose="02020603050405020304" pitchFamily="18" charset="0"/>
-              </a:rPr>
-              <a:t>cillum</a:t>
-            </a:r>
-            <a:r>
-              <a:rPr lang="en-AU" sz="1600" dirty="0">
-                <a:solidFill>
-                  <a:schemeClr val="bg1"/>
-                </a:solidFill>
-                <a:latin typeface="Times New Roman" panose="02020603050405020304" pitchFamily="18" charset="0"/>
-                <a:ea typeface="STZhongsong" panose="020B0503020204020204" pitchFamily="2" charset="-122"/>
-                <a:cs typeface="Times New Roman" panose="02020603050405020304" pitchFamily="18" charset="0"/>
-              </a:rPr>
-              <a:t> dolore </a:t>
-            </a:r>
-            <a:r>
-              <a:rPr lang="en-AU" sz="1600" dirty="0" err="1">
-                <a:solidFill>
-                  <a:schemeClr val="bg1"/>
-                </a:solidFill>
-                <a:latin typeface="Times New Roman" panose="02020603050405020304" pitchFamily="18" charset="0"/>
-                <a:ea typeface="STZhongsong" panose="020B0503020204020204" pitchFamily="2" charset="-122"/>
-                <a:cs typeface="Times New Roman" panose="02020603050405020304" pitchFamily="18" charset="0"/>
-              </a:rPr>
-              <a:t>eu</a:t>
-            </a:r>
-            <a:r>
-              <a:rPr lang="en-AU" sz="1600" dirty="0">
-                <a:solidFill>
-                  <a:schemeClr val="bg1"/>
-                </a:solidFill>
-                <a:latin typeface="Times New Roman" panose="02020603050405020304" pitchFamily="18" charset="0"/>
-                <a:ea typeface="STZhongsong" panose="020B0503020204020204" pitchFamily="2" charset="-122"/>
-                <a:cs typeface="Times New Roman" panose="02020603050405020304" pitchFamily="18" charset="0"/>
-              </a:rPr>
-              <a:t> </a:t>
-            </a:r>
-            <a:r>
-              <a:rPr lang="en-AU" sz="1600" dirty="0" err="1">
-                <a:solidFill>
-                  <a:schemeClr val="bg1"/>
-                </a:solidFill>
-                <a:latin typeface="Times New Roman" panose="02020603050405020304" pitchFamily="18" charset="0"/>
-                <a:ea typeface="STZhongsong" panose="020B0503020204020204" pitchFamily="2" charset="-122"/>
-                <a:cs typeface="Times New Roman" panose="02020603050405020304" pitchFamily="18" charset="0"/>
-              </a:rPr>
-              <a:t>fugiat</a:t>
-            </a:r>
-            <a:r>
-              <a:rPr lang="en-AU" sz="1600" dirty="0">
-                <a:solidFill>
-                  <a:schemeClr val="bg1"/>
-                </a:solidFill>
-                <a:latin typeface="Times New Roman" panose="02020603050405020304" pitchFamily="18" charset="0"/>
-                <a:ea typeface="STZhongsong" panose="020B0503020204020204" pitchFamily="2" charset="-122"/>
-                <a:cs typeface="Times New Roman" panose="02020603050405020304" pitchFamily="18" charset="0"/>
-              </a:rPr>
-              <a:t> nulla </a:t>
-            </a:r>
-            <a:r>
-              <a:rPr lang="en-AU" sz="1600" dirty="0" err="1">
-                <a:solidFill>
-                  <a:schemeClr val="bg1"/>
-                </a:solidFill>
-                <a:latin typeface="Times New Roman" panose="02020603050405020304" pitchFamily="18" charset="0"/>
-                <a:ea typeface="STZhongsong" panose="020B0503020204020204" pitchFamily="2" charset="-122"/>
-                <a:cs typeface="Times New Roman" panose="02020603050405020304" pitchFamily="18" charset="0"/>
-              </a:rPr>
-              <a:t>pariatur</a:t>
-            </a:r>
-            <a:r>
-              <a:rPr lang="en-AU" sz="1600" dirty="0">
-                <a:solidFill>
-                  <a:schemeClr val="bg1"/>
-                </a:solidFill>
-                <a:latin typeface="Times New Roman" panose="02020603050405020304" pitchFamily="18" charset="0"/>
-                <a:ea typeface="STZhongsong" panose="020B0503020204020204" pitchFamily="2" charset="-122"/>
-                <a:cs typeface="Times New Roman" panose="02020603050405020304" pitchFamily="18" charset="0"/>
-              </a:rPr>
-              <a:t>. </a:t>
-            </a:r>
-            <a:r>
-              <a:rPr lang="en-AU" sz="1600" dirty="0" err="1">
-                <a:solidFill>
-                  <a:schemeClr val="bg1"/>
-                </a:solidFill>
-                <a:latin typeface="Times New Roman" panose="02020603050405020304" pitchFamily="18" charset="0"/>
-                <a:ea typeface="STZhongsong" panose="020B0503020204020204" pitchFamily="2" charset="-122"/>
-                <a:cs typeface="Times New Roman" panose="02020603050405020304" pitchFamily="18" charset="0"/>
-              </a:rPr>
-              <a:t>Excepteur</a:t>
-            </a:r>
-            <a:r>
-              <a:rPr lang="en-AU" sz="1600" dirty="0">
-                <a:solidFill>
-                  <a:schemeClr val="bg1"/>
-                </a:solidFill>
-                <a:latin typeface="Times New Roman" panose="02020603050405020304" pitchFamily="18" charset="0"/>
-                <a:ea typeface="STZhongsong" panose="020B0503020204020204" pitchFamily="2" charset="-122"/>
-                <a:cs typeface="Times New Roman" panose="02020603050405020304" pitchFamily="18" charset="0"/>
-              </a:rPr>
-              <a:t> </a:t>
-            </a:r>
-            <a:r>
-              <a:rPr lang="en-AU" sz="1600" dirty="0" err="1">
-                <a:solidFill>
-                  <a:schemeClr val="bg1"/>
-                </a:solidFill>
-                <a:latin typeface="Times New Roman" panose="02020603050405020304" pitchFamily="18" charset="0"/>
-                <a:ea typeface="STZhongsong" panose="020B0503020204020204" pitchFamily="2" charset="-122"/>
-                <a:cs typeface="Times New Roman" panose="02020603050405020304" pitchFamily="18" charset="0"/>
-              </a:rPr>
-              <a:t>sint</a:t>
-            </a:r>
-            <a:r>
-              <a:rPr lang="en-AU" sz="1600" dirty="0">
-                <a:solidFill>
-                  <a:schemeClr val="bg1"/>
-                </a:solidFill>
-                <a:latin typeface="Times New Roman" panose="02020603050405020304" pitchFamily="18" charset="0"/>
-                <a:ea typeface="STZhongsong" panose="020B0503020204020204" pitchFamily="2" charset="-122"/>
-                <a:cs typeface="Times New Roman" panose="02020603050405020304" pitchFamily="18" charset="0"/>
-              </a:rPr>
-              <a:t> </a:t>
-            </a:r>
-            <a:r>
-              <a:rPr lang="en-AU" sz="1600" dirty="0" err="1">
-                <a:solidFill>
-                  <a:schemeClr val="bg1"/>
-                </a:solidFill>
-                <a:latin typeface="Times New Roman" panose="02020603050405020304" pitchFamily="18" charset="0"/>
-                <a:ea typeface="STZhongsong" panose="020B0503020204020204" pitchFamily="2" charset="-122"/>
-                <a:cs typeface="Times New Roman" panose="02020603050405020304" pitchFamily="18" charset="0"/>
-              </a:rPr>
-              <a:t>occaecat</a:t>
-            </a:r>
-            <a:r>
-              <a:rPr lang="en-AU" sz="1600" dirty="0">
-                <a:solidFill>
-                  <a:schemeClr val="bg1"/>
-                </a:solidFill>
-                <a:latin typeface="Times New Roman" panose="02020603050405020304" pitchFamily="18" charset="0"/>
-                <a:ea typeface="STZhongsong" panose="020B0503020204020204" pitchFamily="2" charset="-122"/>
-                <a:cs typeface="Times New Roman" panose="02020603050405020304" pitchFamily="18" charset="0"/>
-              </a:rPr>
-              <a:t> </a:t>
-            </a:r>
-            <a:r>
-              <a:rPr lang="en-AU" sz="1600" dirty="0" err="1">
-                <a:solidFill>
-                  <a:schemeClr val="bg1"/>
-                </a:solidFill>
-                <a:latin typeface="Times New Roman" panose="02020603050405020304" pitchFamily="18" charset="0"/>
-                <a:ea typeface="STZhongsong" panose="020B0503020204020204" pitchFamily="2" charset="-122"/>
-                <a:cs typeface="Times New Roman" panose="02020603050405020304" pitchFamily="18" charset="0"/>
-              </a:rPr>
-              <a:t>cupidatat</a:t>
-            </a:r>
-            <a:r>
-              <a:rPr lang="en-AU" sz="1600" dirty="0">
-                <a:solidFill>
-                  <a:schemeClr val="bg1"/>
-                </a:solidFill>
-                <a:latin typeface="Times New Roman" panose="02020603050405020304" pitchFamily="18" charset="0"/>
-                <a:ea typeface="STZhongsong" panose="020B0503020204020204" pitchFamily="2" charset="-122"/>
-                <a:cs typeface="Times New Roman" panose="02020603050405020304" pitchFamily="18" charset="0"/>
-              </a:rPr>
-              <a:t> non </a:t>
-            </a:r>
-            <a:r>
-              <a:rPr lang="en-AU" sz="1600" dirty="0" err="1">
-                <a:solidFill>
-                  <a:schemeClr val="bg1"/>
-                </a:solidFill>
-                <a:latin typeface="Times New Roman" panose="02020603050405020304" pitchFamily="18" charset="0"/>
-                <a:ea typeface="STZhongsong" panose="020B0503020204020204" pitchFamily="2" charset="-122"/>
-                <a:cs typeface="Times New Roman" panose="02020603050405020304" pitchFamily="18" charset="0"/>
-              </a:rPr>
-              <a:t>proident</a:t>
-            </a:r>
-            <a:r>
-              <a:rPr lang="en-AU" sz="1600" dirty="0">
-                <a:solidFill>
-                  <a:schemeClr val="bg1"/>
-                </a:solidFill>
-                <a:latin typeface="Times New Roman" panose="02020603050405020304" pitchFamily="18" charset="0"/>
-                <a:ea typeface="STZhongsong" panose="020B0503020204020204" pitchFamily="2" charset="-122"/>
-                <a:cs typeface="Times New Roman" panose="02020603050405020304" pitchFamily="18" charset="0"/>
-              </a:rPr>
-              <a:t>, sunt in culpa qui </a:t>
-            </a:r>
-            <a:r>
-              <a:rPr lang="en-AU" sz="1600" dirty="0" err="1">
-                <a:solidFill>
-                  <a:schemeClr val="bg1"/>
-                </a:solidFill>
-                <a:latin typeface="Times New Roman" panose="02020603050405020304" pitchFamily="18" charset="0"/>
-                <a:ea typeface="STZhongsong" panose="020B0503020204020204" pitchFamily="2" charset="-122"/>
-                <a:cs typeface="Times New Roman" panose="02020603050405020304" pitchFamily="18" charset="0"/>
-              </a:rPr>
-              <a:t>officia</a:t>
-            </a:r>
-            <a:r>
-              <a:rPr lang="en-AU" sz="1600" dirty="0">
-                <a:solidFill>
-                  <a:schemeClr val="bg1"/>
-                </a:solidFill>
-                <a:latin typeface="Times New Roman" panose="02020603050405020304" pitchFamily="18" charset="0"/>
-                <a:ea typeface="STZhongsong" panose="020B0503020204020204" pitchFamily="2" charset="-122"/>
-                <a:cs typeface="Times New Roman" panose="02020603050405020304" pitchFamily="18" charset="0"/>
-              </a:rPr>
-              <a:t> </a:t>
-            </a:r>
-            <a:r>
-              <a:rPr lang="en-AU" sz="1600" dirty="0" err="1">
-                <a:solidFill>
-                  <a:schemeClr val="bg1"/>
-                </a:solidFill>
-                <a:latin typeface="Times New Roman" panose="02020603050405020304" pitchFamily="18" charset="0"/>
-                <a:ea typeface="STZhongsong" panose="020B0503020204020204" pitchFamily="2" charset="-122"/>
-                <a:cs typeface="Times New Roman" panose="02020603050405020304" pitchFamily="18" charset="0"/>
-              </a:rPr>
-              <a:t>deserunt</a:t>
-            </a:r>
-            <a:r>
-              <a:rPr lang="en-AU" sz="1600" dirty="0">
-                <a:solidFill>
-                  <a:schemeClr val="bg1"/>
-                </a:solidFill>
-                <a:latin typeface="Times New Roman" panose="02020603050405020304" pitchFamily="18" charset="0"/>
-                <a:ea typeface="STZhongsong" panose="020B0503020204020204" pitchFamily="2" charset="-122"/>
-                <a:cs typeface="Times New Roman" panose="02020603050405020304" pitchFamily="18" charset="0"/>
-              </a:rPr>
-              <a:t> </a:t>
-            </a:r>
-            <a:r>
-              <a:rPr lang="en-AU" sz="1600" dirty="0" err="1">
-                <a:solidFill>
-                  <a:schemeClr val="bg1"/>
-                </a:solidFill>
-                <a:latin typeface="Times New Roman" panose="02020603050405020304" pitchFamily="18" charset="0"/>
-                <a:ea typeface="STZhongsong" panose="020B0503020204020204" pitchFamily="2" charset="-122"/>
-                <a:cs typeface="Times New Roman" panose="02020603050405020304" pitchFamily="18" charset="0"/>
-              </a:rPr>
-              <a:t>mollit</a:t>
-            </a:r>
-            <a:r>
-              <a:rPr lang="en-AU" sz="1600" dirty="0">
-                <a:solidFill>
-                  <a:schemeClr val="bg1"/>
-                </a:solidFill>
-                <a:latin typeface="Times New Roman" panose="02020603050405020304" pitchFamily="18" charset="0"/>
-                <a:ea typeface="STZhongsong" panose="020B0503020204020204" pitchFamily="2" charset="-122"/>
-                <a:cs typeface="Times New Roman" panose="02020603050405020304" pitchFamily="18" charset="0"/>
-              </a:rPr>
-              <a:t> </a:t>
-            </a:r>
-            <a:r>
-              <a:rPr lang="en-AU" sz="1600" dirty="0" err="1">
-                <a:solidFill>
-                  <a:schemeClr val="bg1"/>
-                </a:solidFill>
-                <a:latin typeface="Times New Roman" panose="02020603050405020304" pitchFamily="18" charset="0"/>
-                <a:ea typeface="STZhongsong" panose="020B0503020204020204" pitchFamily="2" charset="-122"/>
-                <a:cs typeface="Times New Roman" panose="02020603050405020304" pitchFamily="18" charset="0"/>
-              </a:rPr>
-              <a:t>anim</a:t>
-            </a:r>
-            <a:r>
-              <a:rPr lang="en-AU" sz="1600" dirty="0">
-                <a:solidFill>
-                  <a:schemeClr val="bg1"/>
-                </a:solidFill>
-                <a:latin typeface="Times New Roman" panose="02020603050405020304" pitchFamily="18" charset="0"/>
-                <a:ea typeface="STZhongsong" panose="020B0503020204020204" pitchFamily="2" charset="-122"/>
-                <a:cs typeface="Times New Roman" panose="02020603050405020304" pitchFamily="18" charset="0"/>
-              </a:rPr>
-              <a:t> id </a:t>
-            </a:r>
-            <a:r>
-              <a:rPr lang="en-AU" sz="1600" dirty="0" err="1">
-                <a:solidFill>
-                  <a:schemeClr val="bg1"/>
-                </a:solidFill>
-                <a:latin typeface="Times New Roman" panose="02020603050405020304" pitchFamily="18" charset="0"/>
-                <a:ea typeface="STZhongsong" panose="020B0503020204020204" pitchFamily="2" charset="-122"/>
-                <a:cs typeface="Times New Roman" panose="02020603050405020304" pitchFamily="18" charset="0"/>
-              </a:rPr>
-              <a:t>est</a:t>
-            </a:r>
-            <a:r>
-              <a:rPr lang="en-AU" sz="1600" dirty="0">
-                <a:solidFill>
-                  <a:schemeClr val="bg1"/>
-                </a:solidFill>
-                <a:latin typeface="Times New Roman" panose="02020603050405020304" pitchFamily="18" charset="0"/>
-                <a:ea typeface="STZhongsong" panose="020B0503020204020204" pitchFamily="2" charset="-122"/>
-                <a:cs typeface="Times New Roman" panose="02020603050405020304" pitchFamily="18" charset="0"/>
-              </a:rPr>
-              <a:t> </a:t>
-            </a:r>
-            <a:r>
-              <a:rPr lang="en-AU" sz="1600" dirty="0" err="1">
-                <a:solidFill>
-                  <a:schemeClr val="bg1"/>
-                </a:solidFill>
-                <a:latin typeface="Times New Roman" panose="02020603050405020304" pitchFamily="18" charset="0"/>
-                <a:ea typeface="STZhongsong" panose="020B0503020204020204" pitchFamily="2" charset="-122"/>
-                <a:cs typeface="Times New Roman" panose="02020603050405020304" pitchFamily="18" charset="0"/>
-              </a:rPr>
-              <a:t>laborum</a:t>
-            </a:r>
-            <a:r>
-              <a:rPr lang="en-AU" sz="1600" dirty="0">
-                <a:solidFill>
-                  <a:schemeClr val="bg1"/>
-                </a:solidFill>
-                <a:latin typeface="Times New Roman" panose="02020603050405020304" pitchFamily="18" charset="0"/>
-                <a:ea typeface="STZhongsong" panose="020B0503020204020204" pitchFamily="2" charset="-122"/>
-                <a:cs typeface="Times New Roman" panose="02020603050405020304" pitchFamily="18" charset="0"/>
-              </a:rPr>
-              <a:t>.</a:t>
-            </a:r>
-          </a:p>
-        </p:txBody>
-      </p:sp>
+              <a:t>@EdgeOfTheField</a:t>
+            </a:r>
+            <a:endParaRPr lang="en-AU" sz="1200" dirty="0">
+              <a:solidFill>
+                <a:schemeClr val="bg1"/>
+              </a:solidFill>
+              <a:latin typeface="Times New Roman" panose="02020603050405020304" pitchFamily="18" charset="0"/>
+              <a:ea typeface="STZhongsong" panose="020B0503020204020204" pitchFamily="2" charset="-122"/>
+              <a:cs typeface="Times New Roman" panose="02020603050405020304" pitchFamily="18" charset="0"/>
+            </a:endParaRPr>
+          </a:p>
+        </p:txBody>
+      </p:sp>
+      <p:pic>
+        <p:nvPicPr>
+          <p:cNvPr id="1032" name="Picture 8" descr="The new X logo that replaced Twitters bird as a white PNG">
+            <a:extLst>
+              <a:ext uri="{FF2B5EF4-FFF2-40B4-BE49-F238E27FC236}">
+                <a16:creationId xmlns:a16="http://schemas.microsoft.com/office/drawing/2014/main" id="{F27486F5-B3C5-C9F3-095C-11C11DD5FB84}"/>
+              </a:ext>
+            </a:extLst>
+          </p:cNvPr>
+          <p:cNvPicPr>
+            <a:picLocks noChangeAspect="1" noChangeArrowheads="1"/>
+          </p:cNvPicPr>
+          <p:nvPr/>
+        </p:nvPicPr>
+        <p:blipFill>
+          <a:blip r:embed="rId4">
+            <a:extLst>
+              <a:ext uri="{28A0092B-C50C-407E-A947-70E740481C1C}">
+                <a14:useLocalDpi xmlns:a14="http://schemas.microsoft.com/office/drawing/2010/main" val="0"/>
+              </a:ext>
+            </a:extLst>
+          </a:blip>
+          <a:srcRect/>
+          <a:stretch>
+            <a:fillRect/>
+          </a:stretch>
+        </p:blipFill>
+        <p:spPr bwMode="auto">
+          <a:xfrm>
+            <a:off x="4222533" y="6563623"/>
+            <a:ext cx="280416" cy="280416"/>
+          </a:xfrm>
+          <a:prstGeom prst="rect">
+            <a:avLst/>
+          </a:prstGeom>
+          <a:noFill/>
+          <a:extLst>
+            <a:ext uri="{909E8E84-426E-40DD-AFC4-6F175D3DCCD1}">
+              <a14:hiddenFill xmlns:a14="http://schemas.microsoft.com/office/drawing/2010/main">
+                <a:solidFill>
+                  <a:srgbClr val="FFFFFF"/>
+                </a:solidFill>
+              </a14:hiddenFill>
+            </a:ext>
+          </a:extLst>
+        </p:spPr>
+      </p:pic>
+      <p:pic>
+        <p:nvPicPr>
+          <p:cNvPr id="12" name="Picture 11" descr="A cat in a circle&#10;&#10;AI-generated content may be incorrect.">
+            <a:extLst>
+              <a:ext uri="{FF2B5EF4-FFF2-40B4-BE49-F238E27FC236}">
+                <a16:creationId xmlns:a16="http://schemas.microsoft.com/office/drawing/2014/main" id="{198158F7-688B-7E21-DD94-AB9022027858}"/>
+              </a:ext>
+            </a:extLst>
+          </p:cNvPr>
+          <p:cNvPicPr>
+            <a:picLocks noChangeAspect="1"/>
+          </p:cNvPicPr>
+          <p:nvPr/>
+        </p:nvPicPr>
+        <p:blipFill>
+          <a:blip r:embed="rId5">
+            <a:extLst>
+              <a:ext uri="{28A0092B-C50C-407E-A947-70E740481C1C}">
+                <a14:useLocalDpi xmlns:a14="http://schemas.microsoft.com/office/drawing/2010/main" val="0"/>
+              </a:ext>
+            </a:extLst>
+          </a:blip>
+          <a:stretch>
+            <a:fillRect/>
+          </a:stretch>
+        </p:blipFill>
+        <p:spPr>
+          <a:xfrm>
+            <a:off x="6391143" y="6528795"/>
+            <a:ext cx="284395" cy="284395"/>
+          </a:xfrm>
+          <a:prstGeom prst="rect">
+            <a:avLst/>
+          </a:prstGeom>
+        </p:spPr>
+      </p:pic>
     </p:spTree>
     <p:extLst>
       <p:ext uri="{BB962C8B-B14F-4D97-AF65-F5344CB8AC3E}">
@@ -9607,7 +10802,13 @@
     </p:bg>
     <p:spTree>
       <p:nvGrpSpPr>
-        <p:cNvPr id="1" name=""/>
+        <p:cNvPr id="1" name="">
+          <a:extLst>
+            <a:ext uri="{FF2B5EF4-FFF2-40B4-BE49-F238E27FC236}">
+              <a16:creationId xmlns:a16="http://schemas.microsoft.com/office/drawing/2014/main" id="{AC3BBA14-B742-6B2D-7371-273E2192CC33}"/>
+            </a:ext>
+          </a:extLst>
+        </p:cNvPr>
         <p:cNvGrpSpPr/>
         <p:nvPr/>
       </p:nvGrpSpPr>
@@ -9624,7 +10825,7 @@
           <p:cNvPr id="1026" name="Picture 2" descr="A blue sky with clouds&#10;&#10;Description automatically generated">
             <a:extLst>
               <a:ext uri="{FF2B5EF4-FFF2-40B4-BE49-F238E27FC236}">
-                <a16:creationId xmlns:a16="http://schemas.microsoft.com/office/drawing/2014/main" id="{9546B39F-2D32-B59C-440A-D908F0CBE0A8}"/>
+                <a16:creationId xmlns:a16="http://schemas.microsoft.com/office/drawing/2014/main" id="{0088438B-D5CC-6653-3C4A-466BC126E0CD}"/>
               </a:ext>
             </a:extLst>
           </p:cNvPr>
@@ -9669,7 +10870,7 @@
           <p:cNvPr id="1031" name="Rectangle 1030">
             <a:extLst>
               <a:ext uri="{FF2B5EF4-FFF2-40B4-BE49-F238E27FC236}">
-                <a16:creationId xmlns:a16="http://schemas.microsoft.com/office/drawing/2014/main" id="{42A4FC2C-047E-45A5-965D-8E1E3BF09BC6}"/>
+                <a16:creationId xmlns:a16="http://schemas.microsoft.com/office/drawing/2014/main" id="{A44F8ED1-1FE4-426D-D58B-5367D5FC42A8}"/>
               </a:ext>
               <a:ext uri="{C183D7F6-B498-43B3-948B-1728B52AA6E4}">
                 <adec:decorative xmlns:adec="http://schemas.microsoft.com/office/drawing/2017/decorative" val="1"/>
@@ -9821,10 +11022,10 @@
       </p:sp>
       <p:sp>
         <p:nvSpPr>
-          <p:cNvPr id="3" name="Rectangle 2">
-            <a:extLst>
-              <a:ext uri="{FF2B5EF4-FFF2-40B4-BE49-F238E27FC236}">
-                <a16:creationId xmlns:a16="http://schemas.microsoft.com/office/drawing/2014/main" id="{B3FF3331-9823-4E15-8BCA-01BD880D90FC}"/>
+          <p:cNvPr id="11" name="Oval 10">
+            <a:extLst>
+              <a:ext uri="{FF2B5EF4-FFF2-40B4-BE49-F238E27FC236}">
+                <a16:creationId xmlns:a16="http://schemas.microsoft.com/office/drawing/2014/main" id="{6B9D8AF9-C89A-29A9-D986-B2E82AD4623A}"/>
               </a:ext>
             </a:extLst>
           </p:cNvPr>
@@ -9833,10 +11034,68 @@
         </p:nvSpPr>
         <p:spPr>
           <a:xfrm>
-            <a:off x="328108" y="0"/>
-            <a:ext cx="3668358" cy="6858000"/>
-          </a:xfrm>
-          <a:prstGeom prst="rect">
+            <a:off x="4011561" y="1342142"/>
+            <a:ext cx="4149276" cy="4154089"/>
+          </a:xfrm>
+          <a:prstGeom prst="ellipse">
+            <a:avLst/>
+          </a:prstGeom>
+          <a:solidFill>
+            <a:srgbClr val="FFFFFF">
+              <a:alpha val="50196"/>
+            </a:srgbClr>
+          </a:solidFill>
+          <a:ln>
+            <a:noFill/>
+          </a:ln>
+        </p:spPr>
+        <p:style>
+          <a:lnRef idx="2">
+            <a:schemeClr val="accent1">
+              <a:shade val="15000"/>
+            </a:schemeClr>
+          </a:lnRef>
+          <a:fillRef idx="1">
+            <a:schemeClr val="accent1"/>
+          </a:fillRef>
+          <a:effectRef idx="0">
+            <a:schemeClr val="accent1"/>
+          </a:effectRef>
+          <a:fontRef idx="minor">
+            <a:schemeClr val="lt1"/>
+          </a:fontRef>
+        </p:style>
+        <p:txBody>
+          <a:bodyPr rtlCol="0" anchor="ctr"/>
+          <a:lstStyle/>
+          <a:p>
+            <a:pPr algn="ctr"/>
+            <a:endParaRPr lang="en-AU">
+              <a:solidFill>
+                <a:srgbClr val="034694"/>
+              </a:solidFill>
+            </a:endParaRPr>
+          </a:p>
+        </p:txBody>
+      </p:sp>
+      <p:sp>
+        <p:nvSpPr>
+          <p:cNvPr id="3" name="Oval 2">
+            <a:extLst>
+              <a:ext uri="{FF2B5EF4-FFF2-40B4-BE49-F238E27FC236}">
+                <a16:creationId xmlns:a16="http://schemas.microsoft.com/office/drawing/2014/main" id="{3E9F1FA1-38B7-C713-F5EC-3E74CEF5F55E}"/>
+              </a:ext>
+            </a:extLst>
+          </p:cNvPr>
+          <p:cNvSpPr/>
+          <p:nvPr/>
+        </p:nvSpPr>
+        <p:spPr>
+          <a:xfrm>
+            <a:off x="4176020" y="1506793"/>
+            <a:ext cx="3839960" cy="3844414"/>
+          </a:xfrm>
+          <a:prstGeom prst="ellipse">
             <a:avLst/>
           </a:prstGeom>
           <a:gradFill flip="none" rotWithShape="1">
@@ -9860,7 +11119,9 @@
                 </a:srgbClr>
               </a:gs>
             </a:gsLst>
-            <a:lin ang="5400000" scaled="1"/>
+            <a:path path="circle">
+              <a:fillToRect l="50000" t="50000" r="50000" b="50000"/>
+            </a:path>
             <a:tileRect/>
           </a:gradFill>
           <a:ln>
@@ -9896,29 +11157,209 @@
           </a:p>
         </p:txBody>
       </p:sp>
-      <p:sp>
-        <p:nvSpPr>
-          <p:cNvPr id="4" name="Rectangle 3">
-            <a:extLst>
-              <a:ext uri="{FF2B5EF4-FFF2-40B4-BE49-F238E27FC236}">
-                <a16:creationId xmlns:a16="http://schemas.microsoft.com/office/drawing/2014/main" id="{1BBA20C6-F9D0-750A-90A8-E39ACA9688B2}"/>
-              </a:ext>
-            </a:extLst>
-          </p:cNvPr>
-          <p:cNvSpPr/>
+      <p:cxnSp>
+        <p:nvCxnSpPr>
+          <p:cNvPr id="13" name="Straight Connector 12">
+            <a:extLst>
+              <a:ext uri="{FF2B5EF4-FFF2-40B4-BE49-F238E27FC236}">
+                <a16:creationId xmlns:a16="http://schemas.microsoft.com/office/drawing/2014/main" id="{BA15B560-8900-8C98-77BC-52A9810725F7}"/>
+              </a:ext>
+            </a:extLst>
+          </p:cNvPr>
+          <p:cNvCxnSpPr/>
           <p:nvPr/>
-        </p:nvSpPr>
+        </p:nvCxnSpPr>
         <p:spPr>
-          <a:xfrm>
-            <a:off x="-86061" y="3429000"/>
-            <a:ext cx="3915783" cy="3099495"/>
+          <a:xfrm flipH="1">
+            <a:off x="855406" y="3429000"/>
+            <a:ext cx="2989007" cy="0"/>
+          </a:xfrm>
+          <a:prstGeom prst="line">
+            <a:avLst/>
+          </a:prstGeom>
+          <a:ln>
+            <a:solidFill>
+              <a:srgbClr val="DBA111"/>
+            </a:solidFill>
+          </a:ln>
+        </p:spPr>
+        <p:style>
+          <a:lnRef idx="2">
+            <a:schemeClr val="accent1"/>
+          </a:lnRef>
+          <a:fillRef idx="0">
+            <a:schemeClr val="accent1"/>
+          </a:fillRef>
+          <a:effectRef idx="1">
+            <a:schemeClr val="accent1"/>
+          </a:effectRef>
+          <a:fontRef idx="minor">
+            <a:schemeClr val="tx1"/>
+          </a:fontRef>
+        </p:style>
+      </p:cxnSp>
+      <p:cxnSp>
+        <p:nvCxnSpPr>
+          <p:cNvPr id="14" name="Straight Connector 13">
+            <a:extLst>
+              <a:ext uri="{FF2B5EF4-FFF2-40B4-BE49-F238E27FC236}">
+                <a16:creationId xmlns:a16="http://schemas.microsoft.com/office/drawing/2014/main" id="{8D782264-5404-CFF1-94AD-906152B77048}"/>
+              </a:ext>
+            </a:extLst>
+          </p:cNvPr>
+          <p:cNvCxnSpPr/>
+          <p:nvPr/>
+        </p:nvCxnSpPr>
+        <p:spPr>
+          <a:xfrm flipH="1">
+            <a:off x="8293509" y="3411794"/>
+            <a:ext cx="2989007" cy="0"/>
+          </a:xfrm>
+          <a:prstGeom prst="line">
+            <a:avLst/>
+          </a:prstGeom>
+          <a:ln>
+            <a:solidFill>
+              <a:srgbClr val="DBA111"/>
+            </a:solidFill>
+          </a:ln>
+        </p:spPr>
+        <p:style>
+          <a:lnRef idx="2">
+            <a:schemeClr val="accent1"/>
+          </a:lnRef>
+          <a:fillRef idx="0">
+            <a:schemeClr val="accent1"/>
+          </a:fillRef>
+          <a:effectRef idx="1">
+            <a:schemeClr val="accent1"/>
+          </a:effectRef>
+          <a:fontRef idx="minor">
+            <a:schemeClr val="tx1"/>
+          </a:fontRef>
+        </p:style>
+      </p:cxnSp>
+    </p:spTree>
+    <p:extLst>
+      <p:ext uri="{BB962C8B-B14F-4D97-AF65-F5344CB8AC3E}">
+        <p14:creationId xmlns:p14="http://schemas.microsoft.com/office/powerpoint/2010/main" val="367599833"/>
+      </p:ext>
+    </p:extLst>
+  </p:cSld>
+  <p:clrMapOvr>
+    <a:masterClrMapping/>
+  </p:clrMapOvr>
+</p:sld>
+</file>
+
+<file path=ppt/slides/slide9.xml><?xml version="1.0" encoding="utf-8"?>
+<p:sld xmlns:a="http://schemas.openxmlformats.org/drawingml/2006/main" xmlns:r="http://schemas.openxmlformats.org/officeDocument/2006/relationships" xmlns:p="http://schemas.openxmlformats.org/presentationml/2006/main">
+  <p:cSld>
+    <p:bg>
+      <p:bgPr>
+        <a:solidFill>
+          <a:schemeClr val="bg1"/>
+        </a:solidFill>
+        <a:effectLst/>
+      </p:bgPr>
+    </p:bg>
+    <p:spTree>
+      <p:nvGrpSpPr>
+        <p:cNvPr id="1" name="">
+          <a:extLst>
+            <a:ext uri="{FF2B5EF4-FFF2-40B4-BE49-F238E27FC236}">
+              <a16:creationId xmlns:a16="http://schemas.microsoft.com/office/drawing/2014/main" id="{370E482A-5202-855E-E9E4-6A71834E26AF}"/>
+            </a:ext>
+          </a:extLst>
+        </p:cNvPr>
+        <p:cNvGrpSpPr/>
+        <p:nvPr/>
+      </p:nvGrpSpPr>
+      <p:grpSpPr>
+        <a:xfrm>
+          <a:off x="0" y="0"/>
+          <a:ext cx="0" cy="0"/>
+          <a:chOff x="0" y="0"/>
+          <a:chExt cx="0" cy="0"/>
+        </a:xfrm>
+      </p:grpSpPr>
+      <p:pic>
+        <p:nvPicPr>
+          <p:cNvPr id="1026" name="Picture 2" descr="A blue sky with clouds&#10;&#10;Description automatically generated">
+            <a:extLst>
+              <a:ext uri="{FF2B5EF4-FFF2-40B4-BE49-F238E27FC236}">
+                <a16:creationId xmlns:a16="http://schemas.microsoft.com/office/drawing/2014/main" id="{209F1D94-484A-D44A-75CB-6AFB785DE5E1}"/>
+              </a:ext>
+            </a:extLst>
+          </p:cNvPr>
+          <p:cNvPicPr>
+            <a:picLocks noGrp="1" noRot="1" noChangeAspect="1" noMove="1" noResize="1" noEditPoints="1" noAdjustHandles="1" noChangeArrowheads="1" noChangeShapeType="1" noCrop="1"/>
+          </p:cNvPicPr>
+          <p:nvPr/>
+        </p:nvPicPr>
+        <p:blipFill>
+          <a:blip r:embed="rId2">
+            <a:extLst>
+              <a:ext uri="{28A0092B-C50C-407E-A947-70E740481C1C}">
+                <a14:useLocalDpi xmlns:a14="http://schemas.microsoft.com/office/drawing/2010/main" val="0"/>
+              </a:ext>
+            </a:extLst>
+          </a:blip>
+          <a:srcRect b="19"/>
+          <a:stretch/>
+        </p:blipFill>
+        <p:spPr bwMode="auto">
+          <a:xfrm>
+            <a:off x="20" y="1282"/>
+            <a:ext cx="12191980" cy="6856718"/>
           </a:xfrm>
           <a:prstGeom prst="rect">
             <a:avLst/>
           </a:prstGeom>
-          <a:solidFill>
-            <a:schemeClr val="bg1"/>
-          </a:solidFill>
+          <a:noFill/>
+          <a:extLst>
+            <a:ext uri="{909E8E84-426E-40DD-AFC4-6F175D3DCCD1}">
+              <a14:hiddenFill xmlns:a14="http://schemas.microsoft.com/office/drawing/2010/main">
+                <a:solidFill>
+                  <a:srgbClr val="FFFFFF"/>
+                </a:solidFill>
+              </a14:hiddenFill>
+            </a:ext>
+          </a:extLst>
+        </p:spPr>
+      </p:pic>
+      <p:sp>
+        <p:nvSpPr>
+          <p:cNvPr id="1031" name="Rectangle 1030">
+            <a:extLst>
+              <a:ext uri="{FF2B5EF4-FFF2-40B4-BE49-F238E27FC236}">
+                <a16:creationId xmlns:a16="http://schemas.microsoft.com/office/drawing/2014/main" id="{EBD5AFAF-D69B-3D98-F064-A2930F94E93C}"/>
+              </a:ext>
+              <a:ext uri="{C183D7F6-B498-43B3-948B-1728B52AA6E4}">
+                <adec:decorative xmlns:adec="http://schemas.microsoft.com/office/drawing/2017/decorative" val="1"/>
+              </a:ext>
+            </a:extLst>
+          </p:cNvPr>
+          <p:cNvSpPr>
+            <a:spLocks noGrp="1" noRot="1" noChangeAspect="1" noMove="1" noResize="1" noEditPoints="1" noAdjustHandles="1" noChangeArrowheads="1" noChangeShapeType="1" noTextEdit="1"/>
+          </p:cNvSpPr>
+          <p:nvPr>
+            <p:extLst>
+              <p:ext uri="{386F3935-93C4-4BCD-93E2-E3B085C9AB24}">
+                <p16:designElem xmlns:p16="http://schemas.microsoft.com/office/powerpoint/2015/main" val="1"/>
+              </p:ext>
+            </p:extLst>
+          </p:nvPr>
+        </p:nvSpPr>
+        <p:spPr bwMode="white">
+          <a:xfrm>
+            <a:off x="1524" y="0"/>
+            <a:ext cx="12188952" cy="6858000"/>
+          </a:xfrm>
+          <a:prstGeom prst="rect">
+            <a:avLst/>
+          </a:prstGeom>
+          <a:noFill/>
           <a:ln>
             <a:noFill/>
           </a:ln>
@@ -9926,7 +11367,7 @@
         <p:style>
           <a:lnRef idx="2">
             <a:schemeClr val="accent1">
-              <a:shade val="15000"/>
+              <a:shade val="50000"/>
             </a:schemeClr>
           </a:lnRef>
           <a:fillRef idx="1">
@@ -9941,111 +11382,111 @@
         </p:style>
         <p:txBody>
           <a:bodyPr rtlCol="0" anchor="ctr"/>
-          <a:lstStyle/>
+          <a:lstStyle>
+            <a:defPPr>
+              <a:defRPr lang="en-US"/>
+            </a:defPPr>
+            <a:lvl1pPr marL="0" algn="l" defTabSz="914400" rtl="0" eaLnBrk="1" latinLnBrk="0" hangingPunct="1">
+              <a:defRPr sz="1800" kern="1200">
+                <a:solidFill>
+                  <a:schemeClr val="lt1"/>
+                </a:solidFill>
+                <a:latin typeface="+mn-lt"/>
+                <a:ea typeface="+mn-ea"/>
+                <a:cs typeface="+mn-cs"/>
+              </a:defRPr>
+            </a:lvl1pPr>
+            <a:lvl2pPr marL="457200" algn="l" defTabSz="914400" rtl="0" eaLnBrk="1" latinLnBrk="0" hangingPunct="1">
+              <a:defRPr sz="1800" kern="1200">
+                <a:solidFill>
+                  <a:schemeClr val="lt1"/>
+                </a:solidFill>
+                <a:latin typeface="+mn-lt"/>
+                <a:ea typeface="+mn-ea"/>
+                <a:cs typeface="+mn-cs"/>
+              </a:defRPr>
+            </a:lvl2pPr>
+            <a:lvl3pPr marL="914400" algn="l" defTabSz="914400" rtl="0" eaLnBrk="1" latinLnBrk="0" hangingPunct="1">
+              <a:defRPr sz="1800" kern="1200">
+                <a:solidFill>
+                  <a:schemeClr val="lt1"/>
+                </a:solidFill>
+                <a:latin typeface="+mn-lt"/>
+                <a:ea typeface="+mn-ea"/>
+                <a:cs typeface="+mn-cs"/>
+              </a:defRPr>
+            </a:lvl3pPr>
+            <a:lvl4pPr marL="1371600" algn="l" defTabSz="914400" rtl="0" eaLnBrk="1" latinLnBrk="0" hangingPunct="1">
+              <a:defRPr sz="1800" kern="1200">
+                <a:solidFill>
+                  <a:schemeClr val="lt1"/>
+                </a:solidFill>
+                <a:latin typeface="+mn-lt"/>
+                <a:ea typeface="+mn-ea"/>
+                <a:cs typeface="+mn-cs"/>
+              </a:defRPr>
+            </a:lvl4pPr>
+            <a:lvl5pPr marL="1828800" algn="l" defTabSz="914400" rtl="0" eaLnBrk="1" latinLnBrk="0" hangingPunct="1">
+              <a:defRPr sz="1800" kern="1200">
+                <a:solidFill>
+                  <a:schemeClr val="lt1"/>
+                </a:solidFill>
+                <a:latin typeface="+mn-lt"/>
+                <a:ea typeface="+mn-ea"/>
+                <a:cs typeface="+mn-cs"/>
+              </a:defRPr>
+            </a:lvl5pPr>
+            <a:lvl6pPr marL="2286000" algn="l" defTabSz="914400" rtl="0" eaLnBrk="1" latinLnBrk="0" hangingPunct="1">
+              <a:defRPr sz="1800" kern="1200">
+                <a:solidFill>
+                  <a:schemeClr val="lt1"/>
+                </a:solidFill>
+                <a:latin typeface="+mn-lt"/>
+                <a:ea typeface="+mn-ea"/>
+                <a:cs typeface="+mn-cs"/>
+              </a:defRPr>
+            </a:lvl6pPr>
+            <a:lvl7pPr marL="2743200" algn="l" defTabSz="914400" rtl="0" eaLnBrk="1" latinLnBrk="0" hangingPunct="1">
+              <a:defRPr sz="1800" kern="1200">
+                <a:solidFill>
+                  <a:schemeClr val="lt1"/>
+                </a:solidFill>
+                <a:latin typeface="+mn-lt"/>
+                <a:ea typeface="+mn-ea"/>
+                <a:cs typeface="+mn-cs"/>
+              </a:defRPr>
+            </a:lvl7pPr>
+            <a:lvl8pPr marL="3200400" algn="l" defTabSz="914400" rtl="0" eaLnBrk="1" latinLnBrk="0" hangingPunct="1">
+              <a:defRPr sz="1800" kern="1200">
+                <a:solidFill>
+                  <a:schemeClr val="lt1"/>
+                </a:solidFill>
+                <a:latin typeface="+mn-lt"/>
+                <a:ea typeface="+mn-ea"/>
+                <a:cs typeface="+mn-cs"/>
+              </a:defRPr>
+            </a:lvl8pPr>
+            <a:lvl9pPr marL="3657600" algn="l" defTabSz="914400" rtl="0" eaLnBrk="1" latinLnBrk="0" hangingPunct="1">
+              <a:defRPr sz="1800" kern="1200">
+                <a:solidFill>
+                  <a:schemeClr val="lt1"/>
+                </a:solidFill>
+                <a:latin typeface="+mn-lt"/>
+                <a:ea typeface="+mn-ea"/>
+                <a:cs typeface="+mn-cs"/>
+              </a:defRPr>
+            </a:lvl9pPr>
+          </a:lstStyle>
           <a:p>
             <a:pPr algn="ctr"/>
-            <a:endParaRPr lang="en-AU"/>
-          </a:p>
-        </p:txBody>
-      </p:sp>
-      <p:pic>
-        <p:nvPicPr>
-          <p:cNvPr id="1030" name="Picture 6" descr="Premier League Logo White - Premier League Logo White Png Transparent ...">
-            <a:extLst>
-              <a:ext uri="{FF2B5EF4-FFF2-40B4-BE49-F238E27FC236}">
-                <a16:creationId xmlns:a16="http://schemas.microsoft.com/office/drawing/2014/main" id="{1F8EECCF-5509-5024-B238-017FC0D2D219}"/>
-              </a:ext>
-            </a:extLst>
-          </p:cNvPr>
-          <p:cNvPicPr>
-            <a:picLocks noChangeAspect="1" noChangeArrowheads="1"/>
-          </p:cNvPicPr>
-          <p:nvPr/>
-        </p:nvPicPr>
-        <p:blipFill>
-          <a:blip r:embed="rId3">
-            <a:extLst>
-              <a:ext uri="{28A0092B-C50C-407E-A947-70E740481C1C}">
-                <a14:useLocalDpi xmlns:a14="http://schemas.microsoft.com/office/drawing/2010/main" val="0"/>
-              </a:ext>
-            </a:extLst>
-          </a:blip>
-          <a:srcRect/>
-          <a:stretch>
-            <a:fillRect/>
-          </a:stretch>
-        </p:blipFill>
-        <p:spPr bwMode="auto">
-          <a:xfrm>
-            <a:off x="853863" y="2881355"/>
-            <a:ext cx="560406" cy="467413"/>
-          </a:xfrm>
-          <a:prstGeom prst="rect">
-            <a:avLst/>
-          </a:prstGeom>
-          <a:noFill/>
-          <a:extLst>
-            <a:ext uri="{909E8E84-426E-40DD-AFC4-6F175D3DCCD1}">
-              <a14:hiddenFill xmlns:a14="http://schemas.microsoft.com/office/drawing/2010/main">
-                <a:solidFill>
-                  <a:srgbClr val="FFFFFF"/>
-                </a:solidFill>
-              </a14:hiddenFill>
-            </a:ext>
-          </a:extLst>
-        </p:spPr>
-      </p:pic>
-      <p:pic>
-        <p:nvPicPr>
-          <p:cNvPr id="10" name="Picture 4">
-            <a:extLst>
-              <a:ext uri="{FF2B5EF4-FFF2-40B4-BE49-F238E27FC236}">
-                <a16:creationId xmlns:a16="http://schemas.microsoft.com/office/drawing/2014/main" id="{9A616D45-18A2-A515-610C-2D8001D1A68E}"/>
-              </a:ext>
-            </a:extLst>
-          </p:cNvPr>
-          <p:cNvPicPr>
-            <a:picLocks noChangeAspect="1" noChangeArrowheads="1"/>
-          </p:cNvPicPr>
-          <p:nvPr/>
-        </p:nvPicPr>
-        <p:blipFill>
-          <a:blip r:embed="rId4">
-            <a:extLst>
-              <a:ext uri="{28A0092B-C50C-407E-A947-70E740481C1C}">
-                <a14:useLocalDpi xmlns:a14="http://schemas.microsoft.com/office/drawing/2010/main" val="0"/>
-              </a:ext>
-            </a:extLst>
-          </a:blip>
-          <a:srcRect/>
-          <a:stretch>
-            <a:fillRect/>
-          </a:stretch>
-        </p:blipFill>
-        <p:spPr bwMode="auto">
-          <a:xfrm>
-            <a:off x="1378603" y="2881355"/>
-            <a:ext cx="498666" cy="509789"/>
-          </a:xfrm>
-          <a:prstGeom prst="rect">
-            <a:avLst/>
-          </a:prstGeom>
-          <a:noFill/>
-          <a:extLst>
-            <a:ext uri="{909E8E84-426E-40DD-AFC4-6F175D3DCCD1}">
-              <a14:hiddenFill xmlns:a14="http://schemas.microsoft.com/office/drawing/2010/main">
-                <a:solidFill>
-                  <a:srgbClr val="FFFFFF"/>
-                </a:solidFill>
-              </a14:hiddenFill>
-            </a:ext>
-          </a:extLst>
-        </p:spPr>
-      </p:pic>
+            <a:endParaRPr lang="en-US"/>
+          </a:p>
+        </p:txBody>
+      </p:sp>
     </p:spTree>
     <p:extLst>
       <p:ext uri="{BB962C8B-B14F-4D97-AF65-F5344CB8AC3E}">
-        <p14:creationId xmlns:p14="http://schemas.microsoft.com/office/powerpoint/2010/main" val="3364396473"/>
+        <p14:creationId xmlns:p14="http://schemas.microsoft.com/office/powerpoint/2010/main" val="1082922049"/>
       </p:ext>
     </p:extLst>
   </p:cSld>

</xml_diff>